<commit_message>
fixing few presentation things (date, motivation)
</commit_message>
<xml_diff>
--- a/Progress Reports CIFRE & Workplans/PhD Interim Report/presentation/Self-Service Data Provisioning through Semantic Enrichment of Data - Updated.pptx
+++ b/Progress Reports CIFRE & Workplans/PhD Interim Report/presentation/Self-Service Data Provisioning through Semantic Enrichment of Data - Updated.pptx
@@ -307,11 +307,11 @@
           <c:showBubbleSize val="0"/>
         </c:dLbls>
         <c:gapWidth val="150"/>
-        <c:axId val="186229888"/>
-        <c:axId val="186231424"/>
+        <c:axId val="170288640"/>
+        <c:axId val="170290176"/>
       </c:barChart>
       <c:catAx>
-        <c:axId val="186229888"/>
+        <c:axId val="170288640"/>
         <c:scaling>
           <c:orientation val="minMax"/>
         </c:scaling>
@@ -320,7 +320,7 @@
         <c:majorTickMark val="out"/>
         <c:minorTickMark val="none"/>
         <c:tickLblPos val="nextTo"/>
-        <c:crossAx val="186231424"/>
+        <c:crossAx val="170290176"/>
         <c:crosses val="autoZero"/>
         <c:auto val="1"/>
         <c:lblAlgn val="ctr"/>
@@ -328,7 +328,7 @@
         <c:noMultiLvlLbl val="0"/>
       </c:catAx>
       <c:valAx>
-        <c:axId val="186231424"/>
+        <c:axId val="170290176"/>
         <c:scaling>
           <c:orientation val="minMax"/>
         </c:scaling>
@@ -339,7 +339,7 @@
         <c:majorTickMark val="out"/>
         <c:minorTickMark val="none"/>
         <c:tickLblPos val="nextTo"/>
-        <c:crossAx val="186229888"/>
+        <c:crossAx val="170288640"/>
         <c:crosses val="autoZero"/>
         <c:crossBetween val="between"/>
       </c:valAx>
@@ -8590,7 +8590,13 @@
               <a:rPr lang="en-US" sz="1600" dirty="0" smtClean="0">
                 <a:latin typeface="Segoe UI Light" panose="020B0502040204020203" pitchFamily="34" charset="0"/>
               </a:rPr>
-              <a:t>March 13, 2014</a:t>
+              <a:t>April 21, </a:t>
+            </a:r>
+            <a:r>
+              <a:rPr lang="en-US" sz="1600" dirty="0" smtClean="0">
+                <a:latin typeface="Segoe UI Light" panose="020B0502040204020203" pitchFamily="34" charset="0"/>
+              </a:rPr>
+              <a:t>2014</a:t>
             </a:r>
             <a:endParaRPr lang="en-US" sz="1600" dirty="0">
               <a:latin typeface="Segoe UI Light" panose="020B0502040204020203" pitchFamily="34" charset="0"/>
@@ -8810,25 +8816,7 @@
               <a:rPr lang="en-US" dirty="0" smtClean="0">
                 <a:latin typeface="Segoe UI Light" panose="020B0502040204020203" pitchFamily="34" charset="0"/>
               </a:rPr>
-              <a:t>Increased the </a:t>
-            </a:r>
-            <a:r>
-              <a:rPr lang="en-US" dirty="0" smtClean="0">
-                <a:latin typeface="Segoe UI Light" panose="020B0502040204020203" pitchFamily="34" charset="0"/>
-              </a:rPr>
-              <a:t>overall confidence score with an average of 11% </a:t>
-            </a:r>
-            <a:r>
-              <a:rPr lang="en-US" dirty="0" smtClean="0">
-                <a:latin typeface="Segoe UI Light" panose="020B0502040204020203" pitchFamily="34" charset="0"/>
-              </a:rPr>
-              <a:t>and </a:t>
-            </a:r>
-            <a:r>
-              <a:rPr lang="en-US" dirty="0" smtClean="0">
-                <a:latin typeface="Segoe UI Light" panose="020B0502040204020203" pitchFamily="34" charset="0"/>
-              </a:rPr>
-              <a:t>the number of valid matches found with an average of 10%</a:t>
+              <a:t>Increased the overall confidence score with an average of 11% and the number of valid matches found with an average of 10%</a:t>
             </a:r>
           </a:p>
           <a:p>
@@ -9201,13 +9189,7 @@
               <a:rPr lang="en-US" dirty="0" smtClean="0">
                 <a:latin typeface="Segoe UI Light" panose="020B0502040204020203" pitchFamily="34" charset="0"/>
               </a:rPr>
-              <a:t>It is difficult </a:t>
-            </a:r>
-            <a:r>
-              <a:rPr lang="en-US" dirty="0" smtClean="0">
-                <a:latin typeface="Segoe UI Light" panose="020B0502040204020203" pitchFamily="34" charset="0"/>
-              </a:rPr>
-              <a:t>to </a:t>
+              <a:t>It is difficult to </a:t>
             </a:r>
             <a:r>
               <a:rPr lang="en-US" dirty="0">
@@ -27499,16 +27481,7 @@
                 </a:solidFill>
                 <a:latin typeface="Segoe UI Light" panose="020B0502040204020203" pitchFamily="34" charset="0"/>
               </a:rPr>
-              <a:t>Searching </a:t>
-            </a:r>
-            <a:r>
-              <a:rPr lang="en-US" dirty="0" smtClean="0">
-                <a:solidFill>
-                  <a:srgbClr val="000000"/>
-                </a:solidFill>
-                <a:latin typeface="Segoe UI Light" panose="020B0502040204020203" pitchFamily="34" charset="0"/>
-              </a:rPr>
-              <a:t>online data portals:</a:t>
+              <a:t>Searching online data portals:</a:t>
             </a:r>
           </a:p>
           <a:p>
@@ -27659,7 +27632,23 @@
                 </a:solidFill>
                 <a:latin typeface="Segoe UI Light" panose="020B0502040204020203" pitchFamily="34" charset="0"/>
               </a:rPr>
-              <a:t>Self-service Data </a:t>
+              <a:t>Self-service Data Provisioning: Several companies like Microsoft integrates data with</a:t>
+            </a:r>
+            <a:r>
+              <a:rPr lang="en-US" dirty="0" smtClean="0">
+                <a:latin typeface="Segoe UI Light" panose="020B0502040204020203" pitchFamily="34" charset="0"/>
+              </a:rPr>
+              <a:t> </a:t>
+            </a:r>
+            <a:r>
+              <a:rPr lang="en-US" dirty="0">
+                <a:solidFill>
+                  <a:srgbClr val="000000"/>
+                </a:solidFill>
+                <a:latin typeface="Segoe UI Light" panose="020B0502040204020203" pitchFamily="34" charset="0"/>
+                <a:hlinkClick r:id="rId7"/>
+              </a:rPr>
+              <a:t>Power </a:t>
             </a:r>
             <a:r>
               <a:rPr lang="en-US" dirty="0" smtClean="0">
@@ -27667,8 +27656,15 @@
                   <a:srgbClr val="000000"/>
                 </a:solidFill>
                 <a:latin typeface="Segoe UI Light" panose="020B0502040204020203" pitchFamily="34" charset="0"/>
-              </a:rPr>
-              <a:t>Provisioning: Several companies like Microsoft integrates </a:t>
+                <a:hlinkClick r:id="rId7"/>
+              </a:rPr>
+              <a:t>Query</a:t>
+            </a:r>
+            <a:r>
+              <a:rPr lang="en-US" dirty="0" smtClean="0">
+                <a:latin typeface="Segoe UI Light" panose="020B0502040204020203" pitchFamily="34" charset="0"/>
+              </a:rPr>
+              <a:t> </a:t>
             </a:r>
             <a:r>
               <a:rPr lang="en-US" dirty="0" smtClean="0">
@@ -27677,64 +27673,8 @@
                 </a:solidFill>
                 <a:latin typeface="Segoe UI Light" panose="020B0502040204020203" pitchFamily="34" charset="0"/>
               </a:rPr>
-              <a:t>data with</a:t>
-            </a:r>
-            <a:r>
-              <a:rPr lang="en-US" dirty="0" smtClean="0">
-                <a:latin typeface="Segoe UI Light" panose="020B0502040204020203" pitchFamily="34" charset="0"/>
-              </a:rPr>
-              <a:t> </a:t>
-            </a:r>
-            <a:r>
-              <a:rPr lang="en-US" dirty="0">
-                <a:solidFill>
-                  <a:srgbClr val="000000"/>
-                </a:solidFill>
-                <a:latin typeface="Segoe UI Light" panose="020B0502040204020203" pitchFamily="34" charset="0"/>
-                <a:hlinkClick r:id="rId7"/>
-              </a:rPr>
-              <a:t>Power </a:t>
-            </a:r>
-            <a:r>
-              <a:rPr lang="en-US" dirty="0" smtClean="0">
-                <a:solidFill>
-                  <a:srgbClr val="000000"/>
-                </a:solidFill>
-                <a:latin typeface="Segoe UI Light" panose="020B0502040204020203" pitchFamily="34" charset="0"/>
-                <a:hlinkClick r:id="rId7"/>
-              </a:rPr>
-              <a:t>Query</a:t>
-            </a:r>
-            <a:r>
-              <a:rPr lang="en-US" dirty="0" smtClean="0">
-                <a:latin typeface="Segoe UI Light" panose="020B0502040204020203" pitchFamily="34" charset="0"/>
-              </a:rPr>
-              <a:t> </a:t>
-            </a:r>
-            <a:r>
-              <a:rPr lang="en-US" dirty="0" smtClean="0">
-                <a:solidFill>
-                  <a:srgbClr val="000000"/>
-                </a:solidFill>
-                <a:latin typeface="Segoe UI Light" panose="020B0502040204020203" pitchFamily="34" charset="0"/>
-              </a:rPr>
-              <a:t>from different </a:t>
-            </a:r>
-            <a:r>
-              <a:rPr lang="en-US" dirty="0" smtClean="0">
-                <a:solidFill>
-                  <a:srgbClr val="000000"/>
-                </a:solidFill>
-                <a:latin typeface="Segoe UI Light" panose="020B0502040204020203" pitchFamily="34" charset="0"/>
-              </a:rPr>
-              <a:t>sources</a:t>
-            </a:r>
-            <a:endParaRPr lang="en-US" dirty="0" smtClean="0">
-              <a:solidFill>
-                <a:srgbClr val="000000"/>
-              </a:solidFill>
-              <a:latin typeface="Segoe UI Light" panose="020B0502040204020203" pitchFamily="34" charset="0"/>
-            </a:endParaRPr>
+              <a:t>from different sources</a:t>
+            </a:r>
           </a:p>
         </p:txBody>
       </p:sp>
@@ -27762,7 +27702,7 @@
               <a:rPr lang="en-US" dirty="0" smtClean="0">
                 <a:latin typeface="Segoe UI Light" panose="020B0502040204020203" pitchFamily="34" charset="0"/>
               </a:rPr>
-              <a:t>Related Work</a:t>
+              <a:t>Motivation</a:t>
             </a:r>
             <a:endParaRPr lang="en-US" b="0" dirty="0">
               <a:latin typeface="Segoe UI Light" panose="020B0502040204020203" pitchFamily="34" charset="0"/>

</xml_diff>

<commit_message>
Minor updates in slides 3, 28 and 30
</commit_message>
<xml_diff>
--- a/Progress Reports CIFRE & Workplans/PhD Interim Report/presentation/Self-Service Data Provisioning through Semantic Enrichment of Data - Updated.pptx
+++ b/Progress Reports CIFRE & Workplans/PhD Interim Report/presentation/Self-Service Data Provisioning through Semantic Enrichment of Data - Updated.pptx
@@ -172,25 +172,13 @@
 
 <file path=ppt/charts/chart1.xml><?xml version="1.0" encoding="utf-8"?>
 <c:chartSpace xmlns:c="http://schemas.openxmlformats.org/drawingml/2006/chart" xmlns:a="http://schemas.openxmlformats.org/drawingml/2006/main" xmlns:r="http://schemas.openxmlformats.org/officeDocument/2006/relationships">
-  <c:date1904 val="0"/>
   <c:lang val="en-US"/>
-  <c:roundedCorners val="0"/>
-  <mc:AlternateContent xmlns:mc="http://schemas.openxmlformats.org/markup-compatibility/2006">
-    <mc:Choice xmlns:c14="http://schemas.microsoft.com/office/drawing/2007/8/2/chart" Requires="c14">
-      <c14:style val="102"/>
-    </mc:Choice>
-    <mc:Fallback>
-      <c:style val="2"/>
-    </mc:Fallback>
-  </mc:AlternateContent>
   <c:chart>
-    <c:autoTitleDeleted val="0"/>
     <c:plotArea>
       <c:layout/>
       <c:barChart>
         <c:barDir val="col"/>
         <c:grouping val="clustered"/>
-        <c:varyColors val="0"/>
         <c:ser>
           <c:idx val="0"/>
           <c:order val="0"/>
@@ -205,7 +193,6 @@
               </c:strCache>
             </c:strRef>
           </c:tx>
-          <c:invertIfNegative val="0"/>
           <c:cat>
             <c:strRef>
               <c:f>'All Matchers'!$J$9:$M$9</c:f>
@@ -233,13 +220,13 @@
                 <c:formatCode>General</c:formatCode>
                 <c:ptCount val="4"/>
                 <c:pt idx="0">
-                  <c:v>0.68180934545454541</c:v>
+                  <c:v>0.68180934545454563</c:v>
                 </c:pt>
                 <c:pt idx="1">
-                  <c:v>0.75200506363636377</c:v>
+                  <c:v>0.75200506363636388</c:v>
                 </c:pt>
                 <c:pt idx="2">
-                  <c:v>0.80377357818181816</c:v>
+                  <c:v>0.80377357818181827</c:v>
                 </c:pt>
                 <c:pt idx="3">
                   <c:v>0.76776128363636365</c:v>
@@ -262,7 +249,6 @@
               </c:strCache>
             </c:strRef>
           </c:tx>
-          <c:invertIfNegative val="0"/>
           <c:cat>
             <c:strRef>
               <c:f>'All Matchers'!$J$9:$M$9</c:f>
@@ -290,7 +276,7 @@
                 <c:formatCode>General</c:formatCode>
                 <c:ptCount val="4"/>
                 <c:pt idx="0">
-                  <c:v>0.83</c:v>
+                  <c:v>0.83000000000000007</c:v>
                 </c:pt>
                 <c:pt idx="1">
                   <c:v>0.8</c:v>
@@ -299,54 +285,39 @@
                   <c:v>0.93</c:v>
                 </c:pt>
                 <c:pt idx="3">
-                  <c:v>0.83</c:v>
+                  <c:v>0.83000000000000007</c:v>
                 </c:pt>
               </c:numCache>
             </c:numRef>
           </c:val>
         </c:ser>
-        <c:dLbls>
-          <c:showLegendKey val="0"/>
-          <c:showVal val="0"/>
-          <c:showCatName val="0"/>
-          <c:showSerName val="0"/>
-          <c:showPercent val="0"/>
-          <c:showBubbleSize val="0"/>
-        </c:dLbls>
-        <c:gapWidth val="150"/>
-        <c:axId val="226323840"/>
-        <c:axId val="226337920"/>
+        <c:dLbls/>
+        <c:axId val="65741184"/>
+        <c:axId val="65742720"/>
       </c:barChart>
       <c:catAx>
-        <c:axId val="226323840"/>
+        <c:axId val="65741184"/>
         <c:scaling>
           <c:orientation val="minMax"/>
         </c:scaling>
-        <c:delete val="0"/>
         <c:axPos val="b"/>
-        <c:majorTickMark val="out"/>
-        <c:minorTickMark val="none"/>
         <c:tickLblPos val="nextTo"/>
-        <c:crossAx val="226337920"/>
+        <c:crossAx val="65742720"/>
         <c:crosses val="autoZero"/>
         <c:auto val="1"/>
         <c:lblAlgn val="ctr"/>
         <c:lblOffset val="100"/>
-        <c:noMultiLvlLbl val="0"/>
       </c:catAx>
       <c:valAx>
-        <c:axId val="226337920"/>
+        <c:axId val="65742720"/>
         <c:scaling>
           <c:orientation val="minMax"/>
         </c:scaling>
-        <c:delete val="0"/>
         <c:axPos val="l"/>
         <c:majorGridlines/>
         <c:numFmt formatCode="General" sourceLinked="1"/>
-        <c:majorTickMark val="out"/>
-        <c:minorTickMark val="none"/>
         <c:tickLblPos val="nextTo"/>
-        <c:crossAx val="226323840"/>
+        <c:crossAx val="65741184"/>
         <c:crosses val="autoZero"/>
         <c:crossBetween val="between"/>
       </c:valAx>
@@ -354,15 +325,11 @@
     <c:legend>
       <c:legendPos val="r"/>
       <c:layout/>
-      <c:overlay val="0"/>
     </c:legend>
     <c:plotVisOnly val="1"/>
     <c:dispBlanksAs val="gap"/>
-    <c:showDLblsOverMax val="0"/>
   </c:chart>
-  <c:externalData r:id="rId1">
-    <c:autoUpdate val="0"/>
-  </c:externalData>
+  <c:externalData r:id="rId1"/>
 </c:chartSpace>
 </file>
 
@@ -428,7 +395,7 @@
     </p:spTree>
     <p:extLst>
       <p:ext uri="{BB962C8B-B14F-4D97-AF65-F5344CB8AC3E}">
-        <p14:creationId xmlns:p14="http://schemas.microsoft.com/office/powerpoint/2010/main" val="3780670118"/>
+        <p14:creationId xmlns:p14="http://schemas.microsoft.com/office/powerpoint/2010/main" xmlns="" val="3780670118"/>
       </p:ext>
     </p:extLst>
   </p:cSld>
@@ -577,7 +544,7 @@
     </p:spTree>
     <p:extLst>
       <p:ext uri="{BB962C8B-B14F-4D97-AF65-F5344CB8AC3E}">
-        <p14:creationId xmlns:p14="http://schemas.microsoft.com/office/powerpoint/2010/main" val="1908748421"/>
+        <p14:creationId xmlns:p14="http://schemas.microsoft.com/office/powerpoint/2010/main" xmlns="" val="1908748421"/>
       </p:ext>
     </p:extLst>
   </p:cSld>
@@ -3010,7 +2977,7 @@
           <a:blip r:embed="rId2" cstate="screen">
             <a:extLst>
               <a:ext uri="{28A0092B-C50C-407E-A947-70E740481C1C}">
-                <a14:useLocalDpi xmlns:a14="http://schemas.microsoft.com/office/drawing/2010/main"/>
+                <a14:useLocalDpi xmlns:a14="http://schemas.microsoft.com/office/drawing/2010/main" xmlns=""/>
               </a:ext>
             </a:extLst>
           </a:blip>
@@ -4940,7 +4907,7 @@
           <a:blip r:embed="rId2" cstate="screen">
             <a:extLst>
               <a:ext uri="{28A0092B-C50C-407E-A947-70E740481C1C}">
-                <a14:useLocalDpi xmlns:a14="http://schemas.microsoft.com/office/drawing/2010/main"/>
+                <a14:useLocalDpi xmlns:a14="http://schemas.microsoft.com/office/drawing/2010/main" xmlns=""/>
               </a:ext>
             </a:extLst>
           </a:blip>
@@ -6083,7 +6050,7 @@
           <a:blip r:embed="rId2" cstate="screen">
             <a:extLst>
               <a:ext uri="{28A0092B-C50C-407E-A947-70E740481C1C}">
-                <a14:useLocalDpi xmlns:a14="http://schemas.microsoft.com/office/drawing/2010/main"/>
+                <a14:useLocalDpi xmlns:a14="http://schemas.microsoft.com/office/drawing/2010/main" xmlns=""/>
               </a:ext>
             </a:extLst>
           </a:blip>
@@ -6340,7 +6307,7 @@
           <a:blip r:embed="rId2" cstate="screen">
             <a:extLst>
               <a:ext uri="{28A0092B-C50C-407E-A947-70E740481C1C}">
-                <a14:useLocalDpi xmlns:a14="http://schemas.microsoft.com/office/drawing/2010/main"/>
+                <a14:useLocalDpi xmlns:a14="http://schemas.microsoft.com/office/drawing/2010/main" xmlns=""/>
               </a:ext>
             </a:extLst>
           </a:blip>
@@ -6773,7 +6740,7 @@
           <a:blip r:embed="rId2" cstate="screen">
             <a:extLst>
               <a:ext uri="{28A0092B-C50C-407E-A947-70E740481C1C}">
-                <a14:useLocalDpi xmlns:a14="http://schemas.microsoft.com/office/drawing/2010/main"/>
+                <a14:useLocalDpi xmlns:a14="http://schemas.microsoft.com/office/drawing/2010/main" xmlns=""/>
               </a:ext>
             </a:extLst>
           </a:blip>
@@ -7001,7 +6968,7 @@
           <a:blip r:embed="rId2" cstate="screen">
             <a:extLst>
               <a:ext uri="{28A0092B-C50C-407E-A947-70E740481C1C}">
-                <a14:useLocalDpi xmlns:a14="http://schemas.microsoft.com/office/drawing/2010/main"/>
+                <a14:useLocalDpi xmlns:a14="http://schemas.microsoft.com/office/drawing/2010/main" xmlns=""/>
               </a:ext>
             </a:extLst>
           </a:blip>
@@ -7221,7 +7188,7 @@
           <a:blip r:embed="rId2" cstate="screen">
             <a:extLst>
               <a:ext uri="{28A0092B-C50C-407E-A947-70E740481C1C}">
-                <a14:useLocalDpi xmlns:a14="http://schemas.microsoft.com/office/drawing/2010/main"/>
+                <a14:useLocalDpi xmlns:a14="http://schemas.microsoft.com/office/drawing/2010/main" xmlns=""/>
               </a:ext>
             </a:extLst>
           </a:blip>
@@ -8272,7 +8239,7 @@
           <a:blip r:embed="rId3" cstate="screen">
             <a:extLst>
               <a:ext uri="{28A0092B-C50C-407E-A947-70E740481C1C}">
-                <a14:useLocalDpi xmlns:a14="http://schemas.microsoft.com/office/drawing/2010/main"/>
+                <a14:useLocalDpi xmlns:a14="http://schemas.microsoft.com/office/drawing/2010/main" xmlns=""/>
               </a:ext>
             </a:extLst>
           </a:blip>
@@ -8290,7 +8257,7 @@
           <a:noFill/>
           <a:extLst>
             <a:ext uri="{909E8E84-426E-40DD-AFC4-6F175D3DCCD1}">
-              <a14:hiddenFill xmlns:a14="http://schemas.microsoft.com/office/drawing/2010/main">
+              <a14:hiddenFill xmlns:a14="http://schemas.microsoft.com/office/drawing/2010/main" xmlns="">
                 <a:solidFill>
                   <a:srgbClr val="FFFFFF"/>
                 </a:solidFill>
@@ -8371,7 +8338,7 @@
           <a:blip r:embed="rId4" cstate="screen">
             <a:extLst>
               <a:ext uri="{28A0092B-C50C-407E-A947-70E740481C1C}">
-                <a14:useLocalDpi xmlns:a14="http://schemas.microsoft.com/office/drawing/2010/main"/>
+                <a14:useLocalDpi xmlns:a14="http://schemas.microsoft.com/office/drawing/2010/main" xmlns=""/>
               </a:ext>
             </a:extLst>
           </a:blip>
@@ -8699,7 +8666,7 @@
           <a:blip r:embed="rId5" cstate="print">
             <a:extLst>
               <a:ext uri="{28A0092B-C50C-407E-A947-70E740481C1C}">
-                <a14:useLocalDpi xmlns:a14="http://schemas.microsoft.com/office/drawing/2010/main" val="0"/>
+                <a14:useLocalDpi xmlns:a14="http://schemas.microsoft.com/office/drawing/2010/main" xmlns="" val="0"/>
               </a:ext>
             </a:extLst>
           </a:blip>
@@ -8719,7 +8686,7 @@
           <a:noFill/>
           <a:extLst>
             <a:ext uri="{909E8E84-426E-40DD-AFC4-6F175D3DCCD1}">
-              <a14:hiddenFill xmlns:a14="http://schemas.microsoft.com/office/drawing/2010/main">
+              <a14:hiddenFill xmlns:a14="http://schemas.microsoft.com/office/drawing/2010/main" xmlns="">
                 <a:solidFill>
                   <a:srgbClr val="FFFFFF"/>
                 </a:solidFill>
@@ -8731,7 +8698,7 @@
     </p:spTree>
     <p:extLst>
       <p:ext uri="{BB962C8B-B14F-4D97-AF65-F5344CB8AC3E}">
-        <p14:creationId xmlns:p14="http://schemas.microsoft.com/office/powerpoint/2010/main" val="2113660080"/>
+        <p14:creationId xmlns:p14="http://schemas.microsoft.com/office/powerpoint/2010/main" xmlns="" val="2113660080"/>
       </p:ext>
     </p:extLst>
   </p:cSld>
@@ -8856,7 +8823,7 @@
             <a:blip r:embed="rId3" cstate="print">
               <a:extLst>
                 <a:ext uri="{28A0092B-C50C-407E-A947-70E740481C1C}">
-                  <a14:useLocalDpi xmlns:a14="http://schemas.microsoft.com/office/drawing/2010/main" val="0"/>
+                  <a14:useLocalDpi xmlns:a14="http://schemas.microsoft.com/office/drawing/2010/main" xmlns="" val="0"/>
                 </a:ext>
               </a:extLst>
             </a:blip>
@@ -8880,14 +8847,14 @@
             <a:effectLst/>
             <a:extLst>
               <a:ext uri="{909E8E84-426E-40DD-AFC4-6F175D3DCCD1}">
-                <a14:hiddenFill xmlns:a14="http://schemas.microsoft.com/office/drawing/2010/main">
+                <a14:hiddenFill xmlns:a14="http://schemas.microsoft.com/office/drawing/2010/main" xmlns="">
                   <a:solidFill>
                     <a:schemeClr val="accent1"/>
                   </a:solidFill>
                 </a14:hiddenFill>
               </a:ext>
               <a:ext uri="{91240B29-F687-4F45-9708-019B960494DF}">
-                <a14:hiddenLine xmlns:a14="http://schemas.microsoft.com/office/drawing/2010/main" w="9525">
+                <a14:hiddenLine xmlns:a14="http://schemas.microsoft.com/office/drawing/2010/main" xmlns="" w="9525">
                   <a:solidFill>
                     <a:schemeClr val="tx1"/>
                   </a:solidFill>
@@ -8897,7 +8864,7 @@
                 </a14:hiddenLine>
               </a:ext>
               <a:ext uri="{AF507438-7753-43E0-B8FC-AC1667EBCBE1}">
-                <a14:hiddenEffects xmlns:a14="http://schemas.microsoft.com/office/drawing/2010/main">
+                <a14:hiddenEffects xmlns:a14="http://schemas.microsoft.com/office/drawing/2010/main" xmlns="">
                   <a:effectLst>
                     <a:outerShdw dist="35921" dir="2700000" algn="ctr" rotWithShape="0">
                       <a:schemeClr val="bg2"/>
@@ -8917,10 +8884,10 @@
             <p:nvPr/>
           </p:nvPicPr>
           <p:blipFill>
-            <a:blip r:embed="rId4">
+            <a:blip r:embed="rId4" cstate="print">
               <a:extLst>
                 <a:ext uri="{28A0092B-C50C-407E-A947-70E740481C1C}">
-                  <a14:useLocalDpi xmlns:a14="http://schemas.microsoft.com/office/drawing/2010/main" val="0"/>
+                  <a14:useLocalDpi xmlns:a14="http://schemas.microsoft.com/office/drawing/2010/main" xmlns="" val="0"/>
                 </a:ext>
               </a:extLst>
             </a:blip>
@@ -8944,14 +8911,14 @@
             <a:effectLst/>
             <a:extLst>
               <a:ext uri="{909E8E84-426E-40DD-AFC4-6F175D3DCCD1}">
-                <a14:hiddenFill xmlns:a14="http://schemas.microsoft.com/office/drawing/2010/main">
+                <a14:hiddenFill xmlns:a14="http://schemas.microsoft.com/office/drawing/2010/main" xmlns="">
                   <a:solidFill>
                     <a:schemeClr val="accent1"/>
                   </a:solidFill>
                 </a14:hiddenFill>
               </a:ext>
               <a:ext uri="{91240B29-F687-4F45-9708-019B960494DF}">
-                <a14:hiddenLine xmlns:a14="http://schemas.microsoft.com/office/drawing/2010/main" w="9525">
+                <a14:hiddenLine xmlns:a14="http://schemas.microsoft.com/office/drawing/2010/main" xmlns="" w="9525">
                   <a:solidFill>
                     <a:schemeClr val="tx1"/>
                   </a:solidFill>
@@ -8961,7 +8928,7 @@
                 </a14:hiddenLine>
               </a:ext>
               <a:ext uri="{AF507438-7753-43E0-B8FC-AC1667EBCBE1}">
-                <a14:hiddenEffects xmlns:a14="http://schemas.microsoft.com/office/drawing/2010/main">
+                <a14:hiddenEffects xmlns:a14="http://schemas.microsoft.com/office/drawing/2010/main" xmlns="">
                   <a:effectLst>
                     <a:outerShdw dist="35921" dir="2700000" algn="ctr" rotWithShape="0">
                       <a:schemeClr val="bg2"/>
@@ -9315,7 +9282,7 @@
           <p:nvPr>
             <p:extLst>
               <p:ext uri="{D42A27DB-BD31-4B8C-83A1-F6EECF244321}">
-                <p14:modId xmlns:p14="http://schemas.microsoft.com/office/powerpoint/2010/main" val="1917374078"/>
+                <p14:modId xmlns:p14="http://schemas.microsoft.com/office/powerpoint/2010/main" xmlns="" val="1917374078"/>
               </p:ext>
             </p:extLst>
           </p:nvPr>
@@ -9677,7 +9644,7 @@
     </p:spTree>
     <p:extLst>
       <p:ext uri="{BB962C8B-B14F-4D97-AF65-F5344CB8AC3E}">
-        <p14:creationId xmlns:p14="http://schemas.microsoft.com/office/powerpoint/2010/main" val="1166442949"/>
+        <p14:creationId xmlns:p14="http://schemas.microsoft.com/office/powerpoint/2010/main" xmlns="" val="1166442949"/>
       </p:ext>
     </p:extLst>
   </p:cSld>
@@ -9780,7 +9747,7 @@
           <p:nvPr>
             <p:extLst>
               <p:ext uri="{D42A27DB-BD31-4B8C-83A1-F6EECF244321}">
-                <p14:modId xmlns:p14="http://schemas.microsoft.com/office/powerpoint/2010/main" val="2361642984"/>
+                <p14:modId xmlns:p14="http://schemas.microsoft.com/office/powerpoint/2010/main" xmlns="" val="2361642984"/>
               </p:ext>
             </p:extLst>
           </p:nvPr>
@@ -10089,7 +10056,7 @@
     </p:spTree>
     <p:extLst>
       <p:ext uri="{BB962C8B-B14F-4D97-AF65-F5344CB8AC3E}">
-        <p14:creationId xmlns:p14="http://schemas.microsoft.com/office/powerpoint/2010/main" val="3095259969"/>
+        <p14:creationId xmlns:p14="http://schemas.microsoft.com/office/powerpoint/2010/main" xmlns="" val="3095259969"/>
       </p:ext>
     </p:extLst>
   </p:cSld>
@@ -10534,7 +10501,7 @@
     </p:spTree>
     <p:extLst>
       <p:ext uri="{BB962C8B-B14F-4D97-AF65-F5344CB8AC3E}">
-        <p14:creationId xmlns:p14="http://schemas.microsoft.com/office/powerpoint/2010/main" val="3477016502"/>
+        <p14:creationId xmlns:p14="http://schemas.microsoft.com/office/powerpoint/2010/main" xmlns="" val="3477016502"/>
       </p:ext>
     </p:extLst>
   </p:cSld>
@@ -12298,7 +12265,7 @@
           <a:blip r:embed="rId3" cstate="print">
             <a:extLst>
               <a:ext uri="{28A0092B-C50C-407E-A947-70E740481C1C}">
-                <a14:useLocalDpi xmlns:a14="http://schemas.microsoft.com/office/drawing/2010/main" val="0"/>
+                <a14:useLocalDpi xmlns:a14="http://schemas.microsoft.com/office/drawing/2010/main" xmlns="" val="0"/>
               </a:ext>
             </a:extLst>
           </a:blip>
@@ -12318,7 +12285,7 @@
           <a:noFill/>
           <a:extLst>
             <a:ext uri="{909E8E84-426E-40DD-AFC4-6F175D3DCCD1}">
-              <a14:hiddenFill xmlns:a14="http://schemas.microsoft.com/office/drawing/2010/main">
+              <a14:hiddenFill xmlns:a14="http://schemas.microsoft.com/office/drawing/2010/main" xmlns="">
                 <a:solidFill>
                   <a:srgbClr val="FFFFFF"/>
                 </a:solidFill>
@@ -12972,7 +12939,7 @@
     </p:spTree>
     <p:extLst>
       <p:ext uri="{BB962C8B-B14F-4D97-AF65-F5344CB8AC3E}">
-        <p14:creationId xmlns:p14="http://schemas.microsoft.com/office/powerpoint/2010/main" val="240339265"/>
+        <p14:creationId xmlns:p14="http://schemas.microsoft.com/office/powerpoint/2010/main" xmlns="" val="240339265"/>
       </p:ext>
     </p:extLst>
   </p:cSld>
@@ -13225,10 +13192,10 @@
           <p:nvPr/>
         </p:nvPicPr>
         <p:blipFill>
-          <a:blip r:embed="rId2">
+          <a:blip r:embed="rId2" cstate="print">
             <a:extLst>
               <a:ext uri="{28A0092B-C50C-407E-A947-70E740481C1C}">
-                <a14:useLocalDpi xmlns:a14="http://schemas.microsoft.com/office/drawing/2010/main" val="0"/>
+                <a14:useLocalDpi xmlns:a14="http://schemas.microsoft.com/office/drawing/2010/main" xmlns="" val="0"/>
               </a:ext>
             </a:extLst>
           </a:blip>
@@ -13252,14 +13219,14 @@
           <a:effectLst/>
           <a:extLst>
             <a:ext uri="{909E8E84-426E-40DD-AFC4-6F175D3DCCD1}">
-              <a14:hiddenFill xmlns:a14="http://schemas.microsoft.com/office/drawing/2010/main">
+              <a14:hiddenFill xmlns:a14="http://schemas.microsoft.com/office/drawing/2010/main" xmlns="">
                 <a:solidFill>
                   <a:schemeClr val="accent1"/>
                 </a:solidFill>
               </a14:hiddenFill>
             </a:ext>
             <a:ext uri="{91240B29-F687-4F45-9708-019B960494DF}">
-              <a14:hiddenLine xmlns:a14="http://schemas.microsoft.com/office/drawing/2010/main" w="9525">
+              <a14:hiddenLine xmlns:a14="http://schemas.microsoft.com/office/drawing/2010/main" xmlns="" w="9525">
                 <a:solidFill>
                   <a:schemeClr val="tx1"/>
                 </a:solidFill>
@@ -13269,7 +13236,7 @@
               </a14:hiddenLine>
             </a:ext>
             <a:ext uri="{AF507438-7753-43E0-B8FC-AC1667EBCBE1}">
-              <a14:hiddenEffects xmlns:a14="http://schemas.microsoft.com/office/drawing/2010/main">
+              <a14:hiddenEffects xmlns:a14="http://schemas.microsoft.com/office/drawing/2010/main" xmlns="">
                 <a:effectLst>
                   <a:outerShdw dist="35921" dir="2700000" algn="ctr" rotWithShape="0">
                     <a:schemeClr val="bg2"/>
@@ -13292,7 +13259,7 @@
           <a:blip r:embed="rId3" cstate="print">
             <a:extLst>
               <a:ext uri="{28A0092B-C50C-407E-A947-70E740481C1C}">
-                <a14:useLocalDpi xmlns:a14="http://schemas.microsoft.com/office/drawing/2010/main" val="0"/>
+                <a14:useLocalDpi xmlns:a14="http://schemas.microsoft.com/office/drawing/2010/main" xmlns="" val="0"/>
               </a:ext>
             </a:extLst>
           </a:blip>
@@ -13316,14 +13283,14 @@
           <a:effectLst/>
           <a:extLst>
             <a:ext uri="{909E8E84-426E-40DD-AFC4-6F175D3DCCD1}">
-              <a14:hiddenFill xmlns:a14="http://schemas.microsoft.com/office/drawing/2010/main">
+              <a14:hiddenFill xmlns:a14="http://schemas.microsoft.com/office/drawing/2010/main" xmlns="">
                 <a:solidFill>
                   <a:schemeClr val="accent1"/>
                 </a:solidFill>
               </a14:hiddenFill>
             </a:ext>
             <a:ext uri="{91240B29-F687-4F45-9708-019B960494DF}">
-              <a14:hiddenLine xmlns:a14="http://schemas.microsoft.com/office/drawing/2010/main" w="9525">
+              <a14:hiddenLine xmlns:a14="http://schemas.microsoft.com/office/drawing/2010/main" xmlns="" w="9525">
                 <a:solidFill>
                   <a:schemeClr val="tx1"/>
                 </a:solidFill>
@@ -13333,7 +13300,7 @@
               </a14:hiddenLine>
             </a:ext>
             <a:ext uri="{AF507438-7753-43E0-B8FC-AC1667EBCBE1}">
-              <a14:hiddenEffects xmlns:a14="http://schemas.microsoft.com/office/drawing/2010/main">
+              <a14:hiddenEffects xmlns:a14="http://schemas.microsoft.com/office/drawing/2010/main" xmlns="">
                 <a:effectLst>
                   <a:outerShdw dist="35921" dir="2700000" algn="ctr" rotWithShape="0">
                     <a:schemeClr val="bg2"/>
@@ -13347,7 +13314,7 @@
     </p:spTree>
     <p:extLst>
       <p:ext uri="{BB962C8B-B14F-4D97-AF65-F5344CB8AC3E}">
-        <p14:creationId xmlns:p14="http://schemas.microsoft.com/office/powerpoint/2010/main" val="2470899453"/>
+        <p14:creationId xmlns:p14="http://schemas.microsoft.com/office/powerpoint/2010/main" xmlns="" val="2470899453"/>
       </p:ext>
     </p:extLst>
   </p:cSld>
@@ -13844,7 +13811,7 @@
     </p:spTree>
     <p:extLst>
       <p:ext uri="{BB962C8B-B14F-4D97-AF65-F5344CB8AC3E}">
-        <p14:creationId xmlns:p14="http://schemas.microsoft.com/office/powerpoint/2010/main" val="3833768114"/>
+        <p14:creationId xmlns:p14="http://schemas.microsoft.com/office/powerpoint/2010/main" xmlns="" val="3833768114"/>
       </p:ext>
     </p:extLst>
   </p:cSld>
@@ -15625,7 +15592,7 @@
           <a:blip r:embed="rId3" cstate="print">
             <a:extLst>
               <a:ext uri="{28A0092B-C50C-407E-A947-70E740481C1C}">
-                <a14:useLocalDpi xmlns:a14="http://schemas.microsoft.com/office/drawing/2010/main" val="0"/>
+                <a14:useLocalDpi xmlns:a14="http://schemas.microsoft.com/office/drawing/2010/main" xmlns="" val="0"/>
               </a:ext>
             </a:extLst>
           </a:blip>
@@ -15645,7 +15612,7 @@
           <a:noFill/>
           <a:extLst>
             <a:ext uri="{909E8E84-426E-40DD-AFC4-6F175D3DCCD1}">
-              <a14:hiddenFill xmlns:a14="http://schemas.microsoft.com/office/drawing/2010/main">
+              <a14:hiddenFill xmlns:a14="http://schemas.microsoft.com/office/drawing/2010/main" xmlns="">
                 <a:solidFill>
                   <a:srgbClr val="FFFFFF"/>
                 </a:solidFill>
@@ -15666,7 +15633,7 @@
           <a:blip r:embed="rId3" cstate="print">
             <a:extLst>
               <a:ext uri="{28A0092B-C50C-407E-A947-70E740481C1C}">
-                <a14:useLocalDpi xmlns:a14="http://schemas.microsoft.com/office/drawing/2010/main" val="0"/>
+                <a14:useLocalDpi xmlns:a14="http://schemas.microsoft.com/office/drawing/2010/main" xmlns="" val="0"/>
               </a:ext>
             </a:extLst>
           </a:blip>
@@ -15686,7 +15653,7 @@
           <a:noFill/>
           <a:extLst>
             <a:ext uri="{909E8E84-426E-40DD-AFC4-6F175D3DCCD1}">
-              <a14:hiddenFill xmlns:a14="http://schemas.microsoft.com/office/drawing/2010/main">
+              <a14:hiddenFill xmlns:a14="http://schemas.microsoft.com/office/drawing/2010/main" xmlns="">
                 <a:solidFill>
                   <a:srgbClr val="FFFFFF"/>
                 </a:solidFill>
@@ -16340,7 +16307,7 @@
     </p:spTree>
     <p:extLst>
       <p:ext uri="{BB962C8B-B14F-4D97-AF65-F5344CB8AC3E}">
-        <p14:creationId xmlns:p14="http://schemas.microsoft.com/office/powerpoint/2010/main" val="3601679413"/>
+        <p14:creationId xmlns:p14="http://schemas.microsoft.com/office/powerpoint/2010/main" xmlns="" val="3601679413"/>
       </p:ext>
     </p:extLst>
   </p:cSld>
@@ -16777,7 +16744,7 @@
     </p:spTree>
     <p:extLst>
       <p:ext uri="{BB962C8B-B14F-4D97-AF65-F5344CB8AC3E}">
-        <p14:creationId xmlns:p14="http://schemas.microsoft.com/office/powerpoint/2010/main" val="2821641039"/>
+        <p14:creationId xmlns:p14="http://schemas.microsoft.com/office/powerpoint/2010/main" xmlns="" val="2821641039"/>
       </p:ext>
     </p:extLst>
   </p:cSld>
@@ -18534,7 +18501,7 @@
           <a:blip r:embed="rId3" cstate="print">
             <a:extLst>
               <a:ext uri="{28A0092B-C50C-407E-A947-70E740481C1C}">
-                <a14:useLocalDpi xmlns:a14="http://schemas.microsoft.com/office/drawing/2010/main" val="0"/>
+                <a14:useLocalDpi xmlns:a14="http://schemas.microsoft.com/office/drawing/2010/main" xmlns="" val="0"/>
               </a:ext>
             </a:extLst>
           </a:blip>
@@ -18554,7 +18521,7 @@
           <a:noFill/>
           <a:extLst>
             <a:ext uri="{909E8E84-426E-40DD-AFC4-6F175D3DCCD1}">
-              <a14:hiddenFill xmlns:a14="http://schemas.microsoft.com/office/drawing/2010/main">
+              <a14:hiddenFill xmlns:a14="http://schemas.microsoft.com/office/drawing/2010/main" xmlns="">
                 <a:solidFill>
                   <a:srgbClr val="FFFFFF"/>
                 </a:solidFill>
@@ -18575,7 +18542,7 @@
           <a:blip r:embed="rId3" cstate="print">
             <a:extLst>
               <a:ext uri="{28A0092B-C50C-407E-A947-70E740481C1C}">
-                <a14:useLocalDpi xmlns:a14="http://schemas.microsoft.com/office/drawing/2010/main" val="0"/>
+                <a14:useLocalDpi xmlns:a14="http://schemas.microsoft.com/office/drawing/2010/main" xmlns="" val="0"/>
               </a:ext>
             </a:extLst>
           </a:blip>
@@ -18595,7 +18562,7 @@
           <a:noFill/>
           <a:extLst>
             <a:ext uri="{909E8E84-426E-40DD-AFC4-6F175D3DCCD1}">
-              <a14:hiddenFill xmlns:a14="http://schemas.microsoft.com/office/drawing/2010/main">
+              <a14:hiddenFill xmlns:a14="http://schemas.microsoft.com/office/drawing/2010/main" xmlns="">
                 <a:solidFill>
                   <a:srgbClr val="FFFFFF"/>
                 </a:solidFill>
@@ -18887,7 +18854,7 @@
           <a:blip r:embed="rId4" cstate="print">
             <a:extLst>
               <a:ext uri="{28A0092B-C50C-407E-A947-70E740481C1C}">
-                <a14:useLocalDpi xmlns:a14="http://schemas.microsoft.com/office/drawing/2010/main" val="0"/>
+                <a14:useLocalDpi xmlns:a14="http://schemas.microsoft.com/office/drawing/2010/main" xmlns="" val="0"/>
               </a:ext>
             </a:extLst>
           </a:blip>
@@ -18907,7 +18874,7 @@
           <a:noFill/>
           <a:extLst>
             <a:ext uri="{909E8E84-426E-40DD-AFC4-6F175D3DCCD1}">
-              <a14:hiddenFill xmlns:a14="http://schemas.microsoft.com/office/drawing/2010/main">
+              <a14:hiddenFill xmlns:a14="http://schemas.microsoft.com/office/drawing/2010/main" xmlns="">
                 <a:solidFill>
                   <a:srgbClr val="FFFFFF"/>
                 </a:solidFill>
@@ -19290,7 +19257,7 @@
     </p:spTree>
     <p:extLst>
       <p:ext uri="{BB962C8B-B14F-4D97-AF65-F5344CB8AC3E}">
-        <p14:creationId xmlns:p14="http://schemas.microsoft.com/office/powerpoint/2010/main" val="791487505"/>
+        <p14:creationId xmlns:p14="http://schemas.microsoft.com/office/powerpoint/2010/main" xmlns="" val="791487505"/>
       </p:ext>
     </p:extLst>
   </p:cSld>
@@ -19622,7 +19589,7 @@
     </p:spTree>
     <p:extLst>
       <p:ext uri="{BB962C8B-B14F-4D97-AF65-F5344CB8AC3E}">
-        <p14:creationId xmlns:p14="http://schemas.microsoft.com/office/powerpoint/2010/main" val="4038042518"/>
+        <p14:creationId xmlns:p14="http://schemas.microsoft.com/office/powerpoint/2010/main" xmlns="" val="4038042518"/>
       </p:ext>
     </p:extLst>
   </p:cSld>
@@ -20251,7 +20218,7 @@
     </p:spTree>
     <p:extLst>
       <p:ext uri="{BB962C8B-B14F-4D97-AF65-F5344CB8AC3E}">
-        <p14:creationId xmlns:p14="http://schemas.microsoft.com/office/powerpoint/2010/main" val="4038849371"/>
+        <p14:creationId xmlns:p14="http://schemas.microsoft.com/office/powerpoint/2010/main" xmlns="" val="4038849371"/>
       </p:ext>
     </p:extLst>
   </p:cSld>
@@ -20558,7 +20525,7 @@
     </p:spTree>
     <p:extLst>
       <p:ext uri="{BB962C8B-B14F-4D97-AF65-F5344CB8AC3E}">
-        <p14:creationId xmlns:p14="http://schemas.microsoft.com/office/powerpoint/2010/main" val="708587349"/>
+        <p14:creationId xmlns:p14="http://schemas.microsoft.com/office/powerpoint/2010/main" xmlns="" val="708587349"/>
       </p:ext>
     </p:extLst>
   </p:cSld>
@@ -20925,7 +20892,7 @@
     </p:spTree>
     <p:extLst>
       <p:ext uri="{BB962C8B-B14F-4D97-AF65-F5344CB8AC3E}">
-        <p14:creationId xmlns:p14="http://schemas.microsoft.com/office/powerpoint/2010/main" val="3771569975"/>
+        <p14:creationId xmlns:p14="http://schemas.microsoft.com/office/powerpoint/2010/main" xmlns="" val="3771569975"/>
       </p:ext>
     </p:extLst>
   </p:cSld>
@@ -21274,7 +21241,7 @@
     </p:spTree>
     <p:extLst>
       <p:ext uri="{BB962C8B-B14F-4D97-AF65-F5344CB8AC3E}">
-        <p14:creationId xmlns:p14="http://schemas.microsoft.com/office/powerpoint/2010/main" val="3505513639"/>
+        <p14:creationId xmlns:p14="http://schemas.microsoft.com/office/powerpoint/2010/main" xmlns="" val="3505513639"/>
       </p:ext>
     </p:extLst>
   </p:cSld>
@@ -22951,7 +22918,7 @@
           <a:blip r:embed="rId3" cstate="print">
             <a:extLst>
               <a:ext uri="{28A0092B-C50C-407E-A947-70E740481C1C}">
-                <a14:useLocalDpi xmlns:a14="http://schemas.microsoft.com/office/drawing/2010/main" val="0"/>
+                <a14:useLocalDpi xmlns:a14="http://schemas.microsoft.com/office/drawing/2010/main" xmlns="" val="0"/>
               </a:ext>
             </a:extLst>
           </a:blip>
@@ -22971,7 +22938,7 @@
           <a:noFill/>
           <a:extLst>
             <a:ext uri="{909E8E84-426E-40DD-AFC4-6F175D3DCCD1}">
-              <a14:hiddenFill xmlns:a14="http://schemas.microsoft.com/office/drawing/2010/main">
+              <a14:hiddenFill xmlns:a14="http://schemas.microsoft.com/office/drawing/2010/main" xmlns="">
                 <a:solidFill>
                   <a:srgbClr val="FFFFFF"/>
                 </a:solidFill>
@@ -22992,7 +22959,7 @@
           <a:blip r:embed="rId3" cstate="print">
             <a:extLst>
               <a:ext uri="{28A0092B-C50C-407E-A947-70E740481C1C}">
-                <a14:useLocalDpi xmlns:a14="http://schemas.microsoft.com/office/drawing/2010/main" val="0"/>
+                <a14:useLocalDpi xmlns:a14="http://schemas.microsoft.com/office/drawing/2010/main" xmlns="" val="0"/>
               </a:ext>
             </a:extLst>
           </a:blip>
@@ -23012,7 +22979,7 @@
           <a:noFill/>
           <a:extLst>
             <a:ext uri="{909E8E84-426E-40DD-AFC4-6F175D3DCCD1}">
-              <a14:hiddenFill xmlns:a14="http://schemas.microsoft.com/office/drawing/2010/main">
+              <a14:hiddenFill xmlns:a14="http://schemas.microsoft.com/office/drawing/2010/main" xmlns="">
                 <a:solidFill>
                   <a:srgbClr val="FFFFFF"/>
                 </a:solidFill>
@@ -23209,7 +23176,7 @@
           <a:blip r:embed="rId4" cstate="print">
             <a:extLst>
               <a:ext uri="{28A0092B-C50C-407E-A947-70E740481C1C}">
-                <a14:useLocalDpi xmlns:a14="http://schemas.microsoft.com/office/drawing/2010/main" val="0"/>
+                <a14:useLocalDpi xmlns:a14="http://schemas.microsoft.com/office/drawing/2010/main" xmlns="" val="0"/>
               </a:ext>
             </a:extLst>
           </a:blip>
@@ -23229,7 +23196,7 @@
           <a:noFill/>
           <a:extLst>
             <a:ext uri="{909E8E84-426E-40DD-AFC4-6F175D3DCCD1}">
-              <a14:hiddenFill xmlns:a14="http://schemas.microsoft.com/office/drawing/2010/main">
+              <a14:hiddenFill xmlns:a14="http://schemas.microsoft.com/office/drawing/2010/main" xmlns="">
                 <a:solidFill>
                   <a:srgbClr val="FFFFFF"/>
                 </a:solidFill>
@@ -23521,7 +23488,7 @@
           <a:blip r:embed="rId4" cstate="print">
             <a:extLst>
               <a:ext uri="{28A0092B-C50C-407E-A947-70E740481C1C}">
-                <a14:useLocalDpi xmlns:a14="http://schemas.microsoft.com/office/drawing/2010/main" val="0"/>
+                <a14:useLocalDpi xmlns:a14="http://schemas.microsoft.com/office/drawing/2010/main" xmlns="" val="0"/>
               </a:ext>
             </a:extLst>
           </a:blip>
@@ -23541,7 +23508,7 @@
           <a:noFill/>
           <a:extLst>
             <a:ext uri="{909E8E84-426E-40DD-AFC4-6F175D3DCCD1}">
-              <a14:hiddenFill xmlns:a14="http://schemas.microsoft.com/office/drawing/2010/main">
+              <a14:hiddenFill xmlns:a14="http://schemas.microsoft.com/office/drawing/2010/main" xmlns="">
                 <a:solidFill>
                   <a:srgbClr val="FFFFFF"/>
                 </a:solidFill>
@@ -23975,7 +23942,7 @@
     </p:spTree>
     <p:extLst>
       <p:ext uri="{BB962C8B-B14F-4D97-AF65-F5344CB8AC3E}">
-        <p14:creationId xmlns:p14="http://schemas.microsoft.com/office/powerpoint/2010/main" val="4253446923"/>
+        <p14:creationId xmlns:p14="http://schemas.microsoft.com/office/powerpoint/2010/main" xmlns="" val="4253446923"/>
       </p:ext>
     </p:extLst>
   </p:cSld>
@@ -24221,7 +24188,7 @@
     </p:spTree>
     <p:extLst>
       <p:ext uri="{BB962C8B-B14F-4D97-AF65-F5344CB8AC3E}">
-        <p14:creationId xmlns:p14="http://schemas.microsoft.com/office/powerpoint/2010/main" val="357821086"/>
+        <p14:creationId xmlns:p14="http://schemas.microsoft.com/office/powerpoint/2010/main" xmlns="" val="357821086"/>
       </p:ext>
     </p:extLst>
   </p:cSld>
@@ -24538,7 +24505,7 @@
     </p:spTree>
     <p:extLst>
       <p:ext uri="{BB962C8B-B14F-4D97-AF65-F5344CB8AC3E}">
-        <p14:creationId xmlns:p14="http://schemas.microsoft.com/office/powerpoint/2010/main" val="812009092"/>
+        <p14:creationId xmlns:p14="http://schemas.microsoft.com/office/powerpoint/2010/main" xmlns="" val="812009092"/>
       </p:ext>
     </p:extLst>
   </p:cSld>
@@ -26258,7 +26225,7 @@
           <a:blip r:embed="rId3" cstate="print">
             <a:extLst>
               <a:ext uri="{28A0092B-C50C-407E-A947-70E740481C1C}">
-                <a14:useLocalDpi xmlns:a14="http://schemas.microsoft.com/office/drawing/2010/main" val="0"/>
+                <a14:useLocalDpi xmlns:a14="http://schemas.microsoft.com/office/drawing/2010/main" xmlns="" val="0"/>
               </a:ext>
             </a:extLst>
           </a:blip>
@@ -26278,7 +26245,7 @@
           <a:noFill/>
           <a:extLst>
             <a:ext uri="{909E8E84-426E-40DD-AFC4-6F175D3DCCD1}">
-              <a14:hiddenFill xmlns:a14="http://schemas.microsoft.com/office/drawing/2010/main">
+              <a14:hiddenFill xmlns:a14="http://schemas.microsoft.com/office/drawing/2010/main" xmlns="">
                 <a:solidFill>
                   <a:srgbClr val="FFFFFF"/>
                 </a:solidFill>
@@ -26299,7 +26266,7 @@
           <a:blip r:embed="rId3" cstate="print">
             <a:extLst>
               <a:ext uri="{28A0092B-C50C-407E-A947-70E740481C1C}">
-                <a14:useLocalDpi xmlns:a14="http://schemas.microsoft.com/office/drawing/2010/main" val="0"/>
+                <a14:useLocalDpi xmlns:a14="http://schemas.microsoft.com/office/drawing/2010/main" xmlns="" val="0"/>
               </a:ext>
             </a:extLst>
           </a:blip>
@@ -26319,7 +26286,7 @@
           <a:noFill/>
           <a:extLst>
             <a:ext uri="{909E8E84-426E-40DD-AFC4-6F175D3DCCD1}">
-              <a14:hiddenFill xmlns:a14="http://schemas.microsoft.com/office/drawing/2010/main">
+              <a14:hiddenFill xmlns:a14="http://schemas.microsoft.com/office/drawing/2010/main" xmlns="">
                 <a:solidFill>
                   <a:srgbClr val="FFFFFF"/>
                 </a:solidFill>
@@ -26516,7 +26483,7 @@
           <a:blip r:embed="rId4" cstate="print">
             <a:extLst>
               <a:ext uri="{28A0092B-C50C-407E-A947-70E740481C1C}">
-                <a14:useLocalDpi xmlns:a14="http://schemas.microsoft.com/office/drawing/2010/main" val="0"/>
+                <a14:useLocalDpi xmlns:a14="http://schemas.microsoft.com/office/drawing/2010/main" xmlns="" val="0"/>
               </a:ext>
             </a:extLst>
           </a:blip>
@@ -26536,7 +26503,7 @@
           <a:noFill/>
           <a:extLst>
             <a:ext uri="{909E8E84-426E-40DD-AFC4-6F175D3DCCD1}">
-              <a14:hiddenFill xmlns:a14="http://schemas.microsoft.com/office/drawing/2010/main">
+              <a14:hiddenFill xmlns:a14="http://schemas.microsoft.com/office/drawing/2010/main" xmlns="">
                 <a:solidFill>
                   <a:srgbClr val="FFFFFF"/>
                 </a:solidFill>
@@ -27006,7 +26973,7 @@
           <a:blip r:embed="rId4" cstate="print">
             <a:extLst>
               <a:ext uri="{28A0092B-C50C-407E-A947-70E740481C1C}">
-                <a14:useLocalDpi xmlns:a14="http://schemas.microsoft.com/office/drawing/2010/main" val="0"/>
+                <a14:useLocalDpi xmlns:a14="http://schemas.microsoft.com/office/drawing/2010/main" xmlns="" val="0"/>
               </a:ext>
             </a:extLst>
           </a:blip>
@@ -27026,7 +26993,7 @@
           <a:noFill/>
           <a:extLst>
             <a:ext uri="{909E8E84-426E-40DD-AFC4-6F175D3DCCD1}">
-              <a14:hiddenFill xmlns:a14="http://schemas.microsoft.com/office/drawing/2010/main">
+              <a14:hiddenFill xmlns:a14="http://schemas.microsoft.com/office/drawing/2010/main" xmlns="">
                 <a:solidFill>
                   <a:srgbClr val="FFFFFF"/>
                 </a:solidFill>
@@ -27047,7 +27014,7 @@
           <a:blip r:embed="rId4" cstate="print">
             <a:extLst>
               <a:ext uri="{28A0092B-C50C-407E-A947-70E740481C1C}">
-                <a14:useLocalDpi xmlns:a14="http://schemas.microsoft.com/office/drawing/2010/main" val="0"/>
+                <a14:useLocalDpi xmlns:a14="http://schemas.microsoft.com/office/drawing/2010/main" xmlns="" val="0"/>
               </a:ext>
             </a:extLst>
           </a:blip>
@@ -27067,7 +27034,7 @@
           <a:noFill/>
           <a:extLst>
             <a:ext uri="{909E8E84-426E-40DD-AFC4-6F175D3DCCD1}">
-              <a14:hiddenFill xmlns:a14="http://schemas.microsoft.com/office/drawing/2010/main">
+              <a14:hiddenFill xmlns:a14="http://schemas.microsoft.com/office/drawing/2010/main" xmlns="">
                 <a:solidFill>
                   <a:srgbClr val="FFFFFF"/>
                 </a:solidFill>
@@ -27088,7 +27055,7 @@
           <a:blip r:embed="rId4" cstate="print">
             <a:extLst>
               <a:ext uri="{28A0092B-C50C-407E-A947-70E740481C1C}">
-                <a14:useLocalDpi xmlns:a14="http://schemas.microsoft.com/office/drawing/2010/main" val="0"/>
+                <a14:useLocalDpi xmlns:a14="http://schemas.microsoft.com/office/drawing/2010/main" xmlns="" val="0"/>
               </a:ext>
             </a:extLst>
           </a:blip>
@@ -27108,7 +27075,7 @@
           <a:noFill/>
           <a:extLst>
             <a:ext uri="{909E8E84-426E-40DD-AFC4-6F175D3DCCD1}">
-              <a14:hiddenFill xmlns:a14="http://schemas.microsoft.com/office/drawing/2010/main">
+              <a14:hiddenFill xmlns:a14="http://schemas.microsoft.com/office/drawing/2010/main" xmlns="">
                 <a:solidFill>
                   <a:srgbClr val="FFFFFF"/>
                 </a:solidFill>
@@ -27491,7 +27458,7 @@
     </p:spTree>
     <p:extLst>
       <p:ext uri="{BB962C8B-B14F-4D97-AF65-F5344CB8AC3E}">
-        <p14:creationId xmlns:p14="http://schemas.microsoft.com/office/powerpoint/2010/main" val="548145660"/>
+        <p14:creationId xmlns:p14="http://schemas.microsoft.com/office/powerpoint/2010/main" xmlns="" val="548145660"/>
       </p:ext>
     </p:extLst>
   </p:cSld>
@@ -27736,7 +27703,7 @@
               <a:rPr lang="en-US" dirty="0" smtClean="0">
                 <a:latin typeface="Segoe UI Light" panose="020B0502040204020203" pitchFamily="34" charset="0"/>
               </a:rPr>
-              <a:t>Use Case</a:t>
+              <a:t>Contributing to the SAP</a:t>
             </a:r>
             <a:r>
               <a:rPr lang="en-US" b="0" dirty="0" smtClean="0">
@@ -27785,7 +27752,7 @@
           <a:blip r:embed="rId3" cstate="print">
             <a:extLst>
               <a:ext uri="{28A0092B-C50C-407E-A947-70E740481C1C}">
-                <a14:useLocalDpi xmlns:a14="http://schemas.microsoft.com/office/drawing/2010/main" val="0"/>
+                <a14:useLocalDpi xmlns:a14="http://schemas.microsoft.com/office/drawing/2010/main" xmlns="" val="0"/>
               </a:ext>
             </a:extLst>
           </a:blip>
@@ -27805,7 +27772,7 @@
           <a:noFill/>
           <a:extLst>
             <a:ext uri="{909E8E84-426E-40DD-AFC4-6F175D3DCCD1}">
-              <a14:hiddenFill xmlns:a14="http://schemas.microsoft.com/office/drawing/2010/main">
+              <a14:hiddenFill xmlns:a14="http://schemas.microsoft.com/office/drawing/2010/main" xmlns="">
                 <a:solidFill>
                   <a:srgbClr val="FFFFFF"/>
                 </a:solidFill>
@@ -27817,7 +27784,7 @@
     </p:spTree>
     <p:extLst>
       <p:ext uri="{BB962C8B-B14F-4D97-AF65-F5344CB8AC3E}">
-        <p14:creationId xmlns:p14="http://schemas.microsoft.com/office/powerpoint/2010/main" val="2874497512"/>
+        <p14:creationId xmlns:p14="http://schemas.microsoft.com/office/powerpoint/2010/main" xmlns="" val="2874497512"/>
       </p:ext>
     </p:extLst>
   </p:cSld>
@@ -27861,10 +27828,10 @@
           <p:nvPr/>
         </p:nvPicPr>
         <p:blipFill>
-          <a:blip r:embed="rId2">
+          <a:blip r:embed="rId2" cstate="print">
             <a:extLst>
               <a:ext uri="{28A0092B-C50C-407E-A947-70E740481C1C}">
-                <a14:useLocalDpi xmlns:a14="http://schemas.microsoft.com/office/drawing/2010/main" val="0"/>
+                <a14:useLocalDpi xmlns:a14="http://schemas.microsoft.com/office/drawing/2010/main" xmlns="" val="0"/>
               </a:ext>
             </a:extLst>
           </a:blip>
@@ -27888,14 +27855,14 @@
           <a:effectLst/>
           <a:extLst>
             <a:ext uri="{909E8E84-426E-40DD-AFC4-6F175D3DCCD1}">
-              <a14:hiddenFill xmlns:a14="http://schemas.microsoft.com/office/drawing/2010/main">
+              <a14:hiddenFill xmlns:a14="http://schemas.microsoft.com/office/drawing/2010/main" xmlns="">
                 <a:solidFill>
                   <a:schemeClr val="accent1"/>
                 </a:solidFill>
               </a14:hiddenFill>
             </a:ext>
             <a:ext uri="{91240B29-F687-4F45-9708-019B960494DF}">
-              <a14:hiddenLine xmlns:a14="http://schemas.microsoft.com/office/drawing/2010/main" w="9525">
+              <a14:hiddenLine xmlns:a14="http://schemas.microsoft.com/office/drawing/2010/main" xmlns="" w="9525">
                 <a:solidFill>
                   <a:schemeClr val="tx1"/>
                 </a:solidFill>
@@ -27905,7 +27872,7 @@
               </a14:hiddenLine>
             </a:ext>
             <a:ext uri="{AF507438-7753-43E0-B8FC-AC1667EBCBE1}">
-              <a14:hiddenEffects xmlns:a14="http://schemas.microsoft.com/office/drawing/2010/main">
+              <a14:hiddenEffects xmlns:a14="http://schemas.microsoft.com/office/drawing/2010/main" xmlns="">
                 <a:effectLst>
                   <a:outerShdw dist="35921" dir="2700000" algn="ctr" rotWithShape="0">
                     <a:schemeClr val="bg2"/>
@@ -28577,10 +28544,10 @@
                   <p:nvPr/>
                 </p:nvPicPr>
                 <p:blipFill>
-                  <a:blip r:embed="rId3">
+                  <a:blip r:embed="rId3" cstate="print">
                     <a:extLst>
                       <a:ext uri="{28A0092B-C50C-407E-A947-70E740481C1C}">
-                        <a14:useLocalDpi xmlns:a14="http://schemas.microsoft.com/office/drawing/2010/main" val="0"/>
+                        <a14:useLocalDpi xmlns:a14="http://schemas.microsoft.com/office/drawing/2010/main" xmlns="" val="0"/>
                       </a:ext>
                     </a:extLst>
                   </a:blip>
@@ -28604,14 +28571,14 @@
                   <a:effectLst/>
                   <a:extLst>
                     <a:ext uri="{909E8E84-426E-40DD-AFC4-6F175D3DCCD1}">
-                      <a14:hiddenFill xmlns:a14="http://schemas.microsoft.com/office/drawing/2010/main">
+                      <a14:hiddenFill xmlns:a14="http://schemas.microsoft.com/office/drawing/2010/main" xmlns="">
                         <a:solidFill>
                           <a:schemeClr val="accent1"/>
                         </a:solidFill>
                       </a14:hiddenFill>
                     </a:ext>
                     <a:ext uri="{91240B29-F687-4F45-9708-019B960494DF}">
-                      <a14:hiddenLine xmlns:a14="http://schemas.microsoft.com/office/drawing/2010/main" w="9525">
+                      <a14:hiddenLine xmlns:a14="http://schemas.microsoft.com/office/drawing/2010/main" xmlns="" w="9525">
                         <a:solidFill>
                           <a:schemeClr val="tx1"/>
                         </a:solidFill>
@@ -28621,7 +28588,7 @@
                       </a14:hiddenLine>
                     </a:ext>
                     <a:ext uri="{AF507438-7753-43E0-B8FC-AC1667EBCBE1}">
-                      <a14:hiddenEffects xmlns:a14="http://schemas.microsoft.com/office/drawing/2010/main">
+                      <a14:hiddenEffects xmlns:a14="http://schemas.microsoft.com/office/drawing/2010/main" xmlns="">
                         <a:effectLst>
                           <a:outerShdw dist="35921" dir="2700000" algn="ctr" rotWithShape="0">
                             <a:schemeClr val="bg2"/>
@@ -28641,10 +28608,10 @@
                   <p:nvPr/>
                 </p:nvPicPr>
                 <p:blipFill>
-                  <a:blip r:embed="rId4">
+                  <a:blip r:embed="rId4" cstate="print">
                     <a:extLst>
                       <a:ext uri="{28A0092B-C50C-407E-A947-70E740481C1C}">
-                        <a14:useLocalDpi xmlns:a14="http://schemas.microsoft.com/office/drawing/2010/main" val="0"/>
+                        <a14:useLocalDpi xmlns:a14="http://schemas.microsoft.com/office/drawing/2010/main" xmlns="" val="0"/>
                       </a:ext>
                     </a:extLst>
                   </a:blip>
@@ -28668,14 +28635,14 @@
                   <a:effectLst/>
                   <a:extLst>
                     <a:ext uri="{909E8E84-426E-40DD-AFC4-6F175D3DCCD1}">
-                      <a14:hiddenFill xmlns:a14="http://schemas.microsoft.com/office/drawing/2010/main">
+                      <a14:hiddenFill xmlns:a14="http://schemas.microsoft.com/office/drawing/2010/main" xmlns="">
                         <a:solidFill>
                           <a:schemeClr val="accent1"/>
                         </a:solidFill>
                       </a14:hiddenFill>
                     </a:ext>
                     <a:ext uri="{91240B29-F687-4F45-9708-019B960494DF}">
-                      <a14:hiddenLine xmlns:a14="http://schemas.microsoft.com/office/drawing/2010/main" w="9525">
+                      <a14:hiddenLine xmlns:a14="http://schemas.microsoft.com/office/drawing/2010/main" xmlns="" w="9525">
                         <a:solidFill>
                           <a:schemeClr val="tx1"/>
                         </a:solidFill>
@@ -28685,7 +28652,7 @@
                       </a14:hiddenLine>
                     </a:ext>
                     <a:ext uri="{AF507438-7753-43E0-B8FC-AC1667EBCBE1}">
-                      <a14:hiddenEffects xmlns:a14="http://schemas.microsoft.com/office/drawing/2010/main">
+                      <a14:hiddenEffects xmlns:a14="http://schemas.microsoft.com/office/drawing/2010/main" xmlns="">
                         <a:effectLst>
                           <a:outerShdw dist="35921" dir="2700000" algn="ctr" rotWithShape="0">
                             <a:schemeClr val="bg2"/>
@@ -28750,10 +28717,10 @@
                   <p:nvPr/>
                 </p:nvPicPr>
                 <p:blipFill>
-                  <a:blip r:embed="rId5">
+                  <a:blip r:embed="rId5" cstate="print">
                     <a:extLst>
                       <a:ext uri="{28A0092B-C50C-407E-A947-70E740481C1C}">
-                        <a14:useLocalDpi xmlns:a14="http://schemas.microsoft.com/office/drawing/2010/main" val="0"/>
+                        <a14:useLocalDpi xmlns:a14="http://schemas.microsoft.com/office/drawing/2010/main" xmlns="" val="0"/>
                       </a:ext>
                     </a:extLst>
                   </a:blip>
@@ -28777,14 +28744,14 @@
                   <a:effectLst/>
                   <a:extLst>
                     <a:ext uri="{909E8E84-426E-40DD-AFC4-6F175D3DCCD1}">
-                      <a14:hiddenFill xmlns:a14="http://schemas.microsoft.com/office/drawing/2010/main">
+                      <a14:hiddenFill xmlns:a14="http://schemas.microsoft.com/office/drawing/2010/main" xmlns="">
                         <a:solidFill>
                           <a:schemeClr val="accent1"/>
                         </a:solidFill>
                       </a14:hiddenFill>
                     </a:ext>
                     <a:ext uri="{91240B29-F687-4F45-9708-019B960494DF}">
-                      <a14:hiddenLine xmlns:a14="http://schemas.microsoft.com/office/drawing/2010/main" w="9525">
+                      <a14:hiddenLine xmlns:a14="http://schemas.microsoft.com/office/drawing/2010/main" xmlns="" w="9525">
                         <a:solidFill>
                           <a:schemeClr val="tx1"/>
                         </a:solidFill>
@@ -28794,7 +28761,7 @@
                       </a14:hiddenLine>
                     </a:ext>
                     <a:ext uri="{AF507438-7753-43E0-B8FC-AC1667EBCBE1}">
-                      <a14:hiddenEffects xmlns:a14="http://schemas.microsoft.com/office/drawing/2010/main">
+                      <a14:hiddenEffects xmlns:a14="http://schemas.microsoft.com/office/drawing/2010/main" xmlns="">
                         <a:effectLst>
                           <a:outerShdw dist="35921" dir="2700000" algn="ctr" rotWithShape="0">
                             <a:schemeClr val="bg2"/>
@@ -28814,10 +28781,10 @@
                   <p:nvPr/>
                 </p:nvPicPr>
                 <p:blipFill>
-                  <a:blip r:embed="rId5">
+                  <a:blip r:embed="rId5" cstate="print">
                     <a:extLst>
                       <a:ext uri="{28A0092B-C50C-407E-A947-70E740481C1C}">
-                        <a14:useLocalDpi xmlns:a14="http://schemas.microsoft.com/office/drawing/2010/main" val="0"/>
+                        <a14:useLocalDpi xmlns:a14="http://schemas.microsoft.com/office/drawing/2010/main" xmlns="" val="0"/>
                       </a:ext>
                     </a:extLst>
                   </a:blip>
@@ -28841,14 +28808,14 @@
                   <a:effectLst/>
                   <a:extLst>
                     <a:ext uri="{909E8E84-426E-40DD-AFC4-6F175D3DCCD1}">
-                      <a14:hiddenFill xmlns:a14="http://schemas.microsoft.com/office/drawing/2010/main">
+                      <a14:hiddenFill xmlns:a14="http://schemas.microsoft.com/office/drawing/2010/main" xmlns="">
                         <a:solidFill>
                           <a:schemeClr val="accent1"/>
                         </a:solidFill>
                       </a14:hiddenFill>
                     </a:ext>
                     <a:ext uri="{91240B29-F687-4F45-9708-019B960494DF}">
-                      <a14:hiddenLine xmlns:a14="http://schemas.microsoft.com/office/drawing/2010/main" w="9525">
+                      <a14:hiddenLine xmlns:a14="http://schemas.microsoft.com/office/drawing/2010/main" xmlns="" w="9525">
                         <a:solidFill>
                           <a:schemeClr val="tx1"/>
                         </a:solidFill>
@@ -28858,7 +28825,7 @@
                       </a14:hiddenLine>
                     </a:ext>
                     <a:ext uri="{AF507438-7753-43E0-B8FC-AC1667EBCBE1}">
-                      <a14:hiddenEffects xmlns:a14="http://schemas.microsoft.com/office/drawing/2010/main">
+                      <a14:hiddenEffects xmlns:a14="http://schemas.microsoft.com/office/drawing/2010/main" xmlns="">
                         <a:effectLst>
                           <a:outerShdw dist="35921" dir="2700000" algn="ctr" rotWithShape="0">
                             <a:schemeClr val="bg2"/>
@@ -28878,10 +28845,10 @@
                   <p:nvPr/>
                 </p:nvPicPr>
                 <p:blipFill>
-                  <a:blip r:embed="rId5">
+                  <a:blip r:embed="rId5" cstate="print">
                     <a:extLst>
                       <a:ext uri="{28A0092B-C50C-407E-A947-70E740481C1C}">
-                        <a14:useLocalDpi xmlns:a14="http://schemas.microsoft.com/office/drawing/2010/main" val="0"/>
+                        <a14:useLocalDpi xmlns:a14="http://schemas.microsoft.com/office/drawing/2010/main" xmlns="" val="0"/>
                       </a:ext>
                     </a:extLst>
                   </a:blip>
@@ -28905,14 +28872,14 @@
                   <a:effectLst/>
                   <a:extLst>
                     <a:ext uri="{909E8E84-426E-40DD-AFC4-6F175D3DCCD1}">
-                      <a14:hiddenFill xmlns:a14="http://schemas.microsoft.com/office/drawing/2010/main">
+                      <a14:hiddenFill xmlns:a14="http://schemas.microsoft.com/office/drawing/2010/main" xmlns="">
                         <a:solidFill>
                           <a:schemeClr val="accent1"/>
                         </a:solidFill>
                       </a14:hiddenFill>
                     </a:ext>
                     <a:ext uri="{91240B29-F687-4F45-9708-019B960494DF}">
-                      <a14:hiddenLine xmlns:a14="http://schemas.microsoft.com/office/drawing/2010/main" w="9525">
+                      <a14:hiddenLine xmlns:a14="http://schemas.microsoft.com/office/drawing/2010/main" xmlns="" w="9525">
                         <a:solidFill>
                           <a:schemeClr val="tx1"/>
                         </a:solidFill>
@@ -28922,7 +28889,7 @@
                       </a14:hiddenLine>
                     </a:ext>
                     <a:ext uri="{AF507438-7753-43E0-B8FC-AC1667EBCBE1}">
-                      <a14:hiddenEffects xmlns:a14="http://schemas.microsoft.com/office/drawing/2010/main">
+                      <a14:hiddenEffects xmlns:a14="http://schemas.microsoft.com/office/drawing/2010/main" xmlns="">
                         <a:effectLst>
                           <a:outerShdw dist="35921" dir="2700000" algn="ctr" rotWithShape="0">
                             <a:schemeClr val="bg2"/>
@@ -28942,10 +28909,10 @@
                   <p:nvPr/>
                 </p:nvPicPr>
                 <p:blipFill>
-                  <a:blip r:embed="rId5">
+                  <a:blip r:embed="rId5" cstate="print">
                     <a:extLst>
                       <a:ext uri="{28A0092B-C50C-407E-A947-70E740481C1C}">
-                        <a14:useLocalDpi xmlns:a14="http://schemas.microsoft.com/office/drawing/2010/main" val="0"/>
+                        <a14:useLocalDpi xmlns:a14="http://schemas.microsoft.com/office/drawing/2010/main" xmlns="" val="0"/>
                       </a:ext>
                     </a:extLst>
                   </a:blip>
@@ -28969,14 +28936,14 @@
                   <a:effectLst/>
                   <a:extLst>
                     <a:ext uri="{909E8E84-426E-40DD-AFC4-6F175D3DCCD1}">
-                      <a14:hiddenFill xmlns:a14="http://schemas.microsoft.com/office/drawing/2010/main">
+                      <a14:hiddenFill xmlns:a14="http://schemas.microsoft.com/office/drawing/2010/main" xmlns="">
                         <a:solidFill>
                           <a:schemeClr val="accent1"/>
                         </a:solidFill>
                       </a14:hiddenFill>
                     </a:ext>
                     <a:ext uri="{91240B29-F687-4F45-9708-019B960494DF}">
-                      <a14:hiddenLine xmlns:a14="http://schemas.microsoft.com/office/drawing/2010/main" w="9525">
+                      <a14:hiddenLine xmlns:a14="http://schemas.microsoft.com/office/drawing/2010/main" xmlns="" w="9525">
                         <a:solidFill>
                           <a:schemeClr val="tx1"/>
                         </a:solidFill>
@@ -28986,7 +28953,7 @@
                       </a14:hiddenLine>
                     </a:ext>
                     <a:ext uri="{AF507438-7753-43E0-B8FC-AC1667EBCBE1}">
-                      <a14:hiddenEffects xmlns:a14="http://schemas.microsoft.com/office/drawing/2010/main">
+                      <a14:hiddenEffects xmlns:a14="http://schemas.microsoft.com/office/drawing/2010/main" xmlns="">
                         <a:effectLst>
                           <a:outerShdw dist="35921" dir="2700000" algn="ctr" rotWithShape="0">
                             <a:schemeClr val="bg2"/>
@@ -29006,10 +28973,10 @@
                   <p:nvPr/>
                 </p:nvPicPr>
                 <p:blipFill>
-                  <a:blip r:embed="rId6">
+                  <a:blip r:embed="rId6" cstate="print">
                     <a:extLst>
                       <a:ext uri="{28A0092B-C50C-407E-A947-70E740481C1C}">
-                        <a14:useLocalDpi xmlns:a14="http://schemas.microsoft.com/office/drawing/2010/main" val="0"/>
+                        <a14:useLocalDpi xmlns:a14="http://schemas.microsoft.com/office/drawing/2010/main" xmlns="" val="0"/>
                       </a:ext>
                     </a:extLst>
                   </a:blip>
@@ -29033,14 +29000,14 @@
                   <a:effectLst/>
                   <a:extLst>
                     <a:ext uri="{909E8E84-426E-40DD-AFC4-6F175D3DCCD1}">
-                      <a14:hiddenFill xmlns:a14="http://schemas.microsoft.com/office/drawing/2010/main">
+                      <a14:hiddenFill xmlns:a14="http://schemas.microsoft.com/office/drawing/2010/main" xmlns="">
                         <a:solidFill>
                           <a:schemeClr val="accent1"/>
                         </a:solidFill>
                       </a14:hiddenFill>
                     </a:ext>
                     <a:ext uri="{91240B29-F687-4F45-9708-019B960494DF}">
-                      <a14:hiddenLine xmlns:a14="http://schemas.microsoft.com/office/drawing/2010/main" w="9525">
+                      <a14:hiddenLine xmlns:a14="http://schemas.microsoft.com/office/drawing/2010/main" xmlns="" w="9525">
                         <a:solidFill>
                           <a:schemeClr val="tx1"/>
                         </a:solidFill>
@@ -29050,7 +29017,7 @@
                       </a14:hiddenLine>
                     </a:ext>
                     <a:ext uri="{AF507438-7753-43E0-B8FC-AC1667EBCBE1}">
-                      <a14:hiddenEffects xmlns:a14="http://schemas.microsoft.com/office/drawing/2010/main">
+                      <a14:hiddenEffects xmlns:a14="http://schemas.microsoft.com/office/drawing/2010/main" xmlns="">
                         <a:effectLst>
                           <a:outerShdw dist="35921" dir="2700000" algn="ctr" rotWithShape="0">
                             <a:schemeClr val="bg2"/>
@@ -29071,10 +29038,10 @@
                 <p:nvPr/>
               </p:nvPicPr>
               <p:blipFill>
-                <a:blip r:embed="rId7">
+                <a:blip r:embed="rId7" cstate="print">
                   <a:extLst>
                     <a:ext uri="{28A0092B-C50C-407E-A947-70E740481C1C}">
-                      <a14:useLocalDpi xmlns:a14="http://schemas.microsoft.com/office/drawing/2010/main" val="0"/>
+                      <a14:useLocalDpi xmlns:a14="http://schemas.microsoft.com/office/drawing/2010/main" xmlns="" val="0"/>
                     </a:ext>
                   </a:extLst>
                 </a:blip>
@@ -29098,14 +29065,14 @@
                 <a:effectLst/>
                 <a:extLst>
                   <a:ext uri="{909E8E84-426E-40DD-AFC4-6F175D3DCCD1}">
-                    <a14:hiddenFill xmlns:a14="http://schemas.microsoft.com/office/drawing/2010/main">
+                    <a14:hiddenFill xmlns:a14="http://schemas.microsoft.com/office/drawing/2010/main" xmlns="">
                       <a:solidFill>
                         <a:schemeClr val="accent1"/>
                       </a:solidFill>
                     </a14:hiddenFill>
                   </a:ext>
                   <a:ext uri="{91240B29-F687-4F45-9708-019B960494DF}">
-                    <a14:hiddenLine xmlns:a14="http://schemas.microsoft.com/office/drawing/2010/main" w="9525">
+                    <a14:hiddenLine xmlns:a14="http://schemas.microsoft.com/office/drawing/2010/main" xmlns="" w="9525">
                       <a:solidFill>
                         <a:schemeClr val="tx1"/>
                       </a:solidFill>
@@ -29115,7 +29082,7 @@
                     </a14:hiddenLine>
                   </a:ext>
                   <a:ext uri="{AF507438-7753-43E0-B8FC-AC1667EBCBE1}">
-                    <a14:hiddenEffects xmlns:a14="http://schemas.microsoft.com/office/drawing/2010/main">
+                    <a14:hiddenEffects xmlns:a14="http://schemas.microsoft.com/office/drawing/2010/main" xmlns="">
                       <a:effectLst>
                         <a:outerShdw dist="35921" dir="2700000" algn="ctr" rotWithShape="0">
                           <a:schemeClr val="bg2"/>
@@ -29135,10 +29102,10 @@
                 <p:nvPr/>
               </p:nvPicPr>
               <p:blipFill>
-                <a:blip r:embed="rId7">
+                <a:blip r:embed="rId7" cstate="print">
                   <a:extLst>
                     <a:ext uri="{28A0092B-C50C-407E-A947-70E740481C1C}">
-                      <a14:useLocalDpi xmlns:a14="http://schemas.microsoft.com/office/drawing/2010/main" val="0"/>
+                      <a14:useLocalDpi xmlns:a14="http://schemas.microsoft.com/office/drawing/2010/main" xmlns="" val="0"/>
                     </a:ext>
                   </a:extLst>
                 </a:blip>
@@ -29162,14 +29129,14 @@
                 <a:effectLst/>
                 <a:extLst>
                   <a:ext uri="{909E8E84-426E-40DD-AFC4-6F175D3DCCD1}">
-                    <a14:hiddenFill xmlns:a14="http://schemas.microsoft.com/office/drawing/2010/main">
+                    <a14:hiddenFill xmlns:a14="http://schemas.microsoft.com/office/drawing/2010/main" xmlns="">
                       <a:solidFill>
                         <a:schemeClr val="accent1"/>
                       </a:solidFill>
                     </a14:hiddenFill>
                   </a:ext>
                   <a:ext uri="{91240B29-F687-4F45-9708-019B960494DF}">
-                    <a14:hiddenLine xmlns:a14="http://schemas.microsoft.com/office/drawing/2010/main" w="9525">
+                    <a14:hiddenLine xmlns:a14="http://schemas.microsoft.com/office/drawing/2010/main" xmlns="" w="9525">
                       <a:solidFill>
                         <a:schemeClr val="tx1"/>
                       </a:solidFill>
@@ -29179,7 +29146,7 @@
                     </a14:hiddenLine>
                   </a:ext>
                   <a:ext uri="{AF507438-7753-43E0-B8FC-AC1667EBCBE1}">
-                    <a14:hiddenEffects xmlns:a14="http://schemas.microsoft.com/office/drawing/2010/main">
+                    <a14:hiddenEffects xmlns:a14="http://schemas.microsoft.com/office/drawing/2010/main" xmlns="">
                       <a:effectLst>
                         <a:outerShdw dist="35921" dir="2700000" algn="ctr" rotWithShape="0">
                           <a:schemeClr val="bg2"/>
@@ -29199,10 +29166,10 @@
                 <p:nvPr/>
               </p:nvPicPr>
               <p:blipFill>
-                <a:blip r:embed="rId7">
+                <a:blip r:embed="rId7" cstate="print">
                   <a:extLst>
                     <a:ext uri="{28A0092B-C50C-407E-A947-70E740481C1C}">
-                      <a14:useLocalDpi xmlns:a14="http://schemas.microsoft.com/office/drawing/2010/main" val="0"/>
+                      <a14:useLocalDpi xmlns:a14="http://schemas.microsoft.com/office/drawing/2010/main" xmlns="" val="0"/>
                     </a:ext>
                   </a:extLst>
                 </a:blip>
@@ -29226,14 +29193,14 @@
                 <a:effectLst/>
                 <a:extLst>
                   <a:ext uri="{909E8E84-426E-40DD-AFC4-6F175D3DCCD1}">
-                    <a14:hiddenFill xmlns:a14="http://schemas.microsoft.com/office/drawing/2010/main">
+                    <a14:hiddenFill xmlns:a14="http://schemas.microsoft.com/office/drawing/2010/main" xmlns="">
                       <a:solidFill>
                         <a:schemeClr val="accent1"/>
                       </a:solidFill>
                     </a14:hiddenFill>
                   </a:ext>
                   <a:ext uri="{91240B29-F687-4F45-9708-019B960494DF}">
-                    <a14:hiddenLine xmlns:a14="http://schemas.microsoft.com/office/drawing/2010/main" w="9525">
+                    <a14:hiddenLine xmlns:a14="http://schemas.microsoft.com/office/drawing/2010/main" xmlns="" w="9525">
                       <a:solidFill>
                         <a:schemeClr val="tx1"/>
                       </a:solidFill>
@@ -29243,7 +29210,7 @@
                     </a14:hiddenLine>
                   </a:ext>
                   <a:ext uri="{AF507438-7753-43E0-B8FC-AC1667EBCBE1}">
-                    <a14:hiddenEffects xmlns:a14="http://schemas.microsoft.com/office/drawing/2010/main">
+                    <a14:hiddenEffects xmlns:a14="http://schemas.microsoft.com/office/drawing/2010/main" xmlns="">
                       <a:effectLst>
                         <a:outerShdw dist="35921" dir="2700000" algn="ctr" rotWithShape="0">
                           <a:schemeClr val="bg2"/>
@@ -29263,10 +29230,10 @@
                 <p:nvPr/>
               </p:nvPicPr>
               <p:blipFill>
-                <a:blip r:embed="rId7">
+                <a:blip r:embed="rId7" cstate="print">
                   <a:extLst>
                     <a:ext uri="{28A0092B-C50C-407E-A947-70E740481C1C}">
-                      <a14:useLocalDpi xmlns:a14="http://schemas.microsoft.com/office/drawing/2010/main" val="0"/>
+                      <a14:useLocalDpi xmlns:a14="http://schemas.microsoft.com/office/drawing/2010/main" xmlns="" val="0"/>
                     </a:ext>
                   </a:extLst>
                 </a:blip>
@@ -29290,14 +29257,14 @@
                 <a:effectLst/>
                 <a:extLst>
                   <a:ext uri="{909E8E84-426E-40DD-AFC4-6F175D3DCCD1}">
-                    <a14:hiddenFill xmlns:a14="http://schemas.microsoft.com/office/drawing/2010/main">
+                    <a14:hiddenFill xmlns:a14="http://schemas.microsoft.com/office/drawing/2010/main" xmlns="">
                       <a:solidFill>
                         <a:schemeClr val="accent1"/>
                       </a:solidFill>
                     </a14:hiddenFill>
                   </a:ext>
                   <a:ext uri="{91240B29-F687-4F45-9708-019B960494DF}">
-                    <a14:hiddenLine xmlns:a14="http://schemas.microsoft.com/office/drawing/2010/main" w="9525">
+                    <a14:hiddenLine xmlns:a14="http://schemas.microsoft.com/office/drawing/2010/main" xmlns="" w="9525">
                       <a:solidFill>
                         <a:schemeClr val="tx1"/>
                       </a:solidFill>
@@ -29307,7 +29274,7 @@
                     </a14:hiddenLine>
                   </a:ext>
                   <a:ext uri="{AF507438-7753-43E0-B8FC-AC1667EBCBE1}">
-                    <a14:hiddenEffects xmlns:a14="http://schemas.microsoft.com/office/drawing/2010/main">
+                    <a14:hiddenEffects xmlns:a14="http://schemas.microsoft.com/office/drawing/2010/main" xmlns="">
                       <a:effectLst>
                         <a:outerShdw dist="35921" dir="2700000" algn="ctr" rotWithShape="0">
                           <a:schemeClr val="bg2"/>
@@ -29502,10 +29469,10 @@
                 <p:nvPr/>
               </p:nvPicPr>
               <p:blipFill>
-                <a:blip r:embed="rId4">
+                <a:blip r:embed="rId4" cstate="print">
                   <a:extLst>
                     <a:ext uri="{28A0092B-C50C-407E-A947-70E740481C1C}">
-                      <a14:useLocalDpi xmlns:a14="http://schemas.microsoft.com/office/drawing/2010/main" val="0"/>
+                      <a14:useLocalDpi xmlns:a14="http://schemas.microsoft.com/office/drawing/2010/main" xmlns="" val="0"/>
                     </a:ext>
                   </a:extLst>
                 </a:blip>
@@ -29529,14 +29496,14 @@
                 <a:effectLst/>
                 <a:extLst>
                   <a:ext uri="{909E8E84-426E-40DD-AFC4-6F175D3DCCD1}">
-                    <a14:hiddenFill xmlns:a14="http://schemas.microsoft.com/office/drawing/2010/main">
+                    <a14:hiddenFill xmlns:a14="http://schemas.microsoft.com/office/drawing/2010/main" xmlns="">
                       <a:solidFill>
                         <a:schemeClr val="accent1"/>
                       </a:solidFill>
                     </a14:hiddenFill>
                   </a:ext>
                   <a:ext uri="{91240B29-F687-4F45-9708-019B960494DF}">
-                    <a14:hiddenLine xmlns:a14="http://schemas.microsoft.com/office/drawing/2010/main" w="9525">
+                    <a14:hiddenLine xmlns:a14="http://schemas.microsoft.com/office/drawing/2010/main" xmlns="" w="9525">
                       <a:solidFill>
                         <a:schemeClr val="tx1"/>
                       </a:solidFill>
@@ -29546,7 +29513,7 @@
                     </a14:hiddenLine>
                   </a:ext>
                   <a:ext uri="{AF507438-7753-43E0-B8FC-AC1667EBCBE1}">
-                    <a14:hiddenEffects xmlns:a14="http://schemas.microsoft.com/office/drawing/2010/main">
+                    <a14:hiddenEffects xmlns:a14="http://schemas.microsoft.com/office/drawing/2010/main" xmlns="">
                       <a:effectLst>
                         <a:outerShdw dist="35921" dir="2700000" algn="ctr" rotWithShape="0">
                           <a:schemeClr val="bg2"/>
@@ -29611,10 +29578,10 @@
                 <p:nvPr/>
               </p:nvPicPr>
               <p:blipFill>
-                <a:blip r:embed="rId6">
+                <a:blip r:embed="rId6" cstate="print">
                   <a:extLst>
                     <a:ext uri="{28A0092B-C50C-407E-A947-70E740481C1C}">
-                      <a14:useLocalDpi xmlns:a14="http://schemas.microsoft.com/office/drawing/2010/main" val="0"/>
+                      <a14:useLocalDpi xmlns:a14="http://schemas.microsoft.com/office/drawing/2010/main" xmlns="" val="0"/>
                     </a:ext>
                   </a:extLst>
                 </a:blip>
@@ -29638,14 +29605,14 @@
                 <a:effectLst/>
                 <a:extLst>
                   <a:ext uri="{909E8E84-426E-40DD-AFC4-6F175D3DCCD1}">
-                    <a14:hiddenFill xmlns:a14="http://schemas.microsoft.com/office/drawing/2010/main">
+                    <a14:hiddenFill xmlns:a14="http://schemas.microsoft.com/office/drawing/2010/main" xmlns="">
                       <a:solidFill>
                         <a:schemeClr val="accent1"/>
                       </a:solidFill>
                     </a14:hiddenFill>
                   </a:ext>
                   <a:ext uri="{91240B29-F687-4F45-9708-019B960494DF}">
-                    <a14:hiddenLine xmlns:a14="http://schemas.microsoft.com/office/drawing/2010/main" w="9525">
+                    <a14:hiddenLine xmlns:a14="http://schemas.microsoft.com/office/drawing/2010/main" xmlns="" w="9525">
                       <a:solidFill>
                         <a:schemeClr val="tx1"/>
                       </a:solidFill>
@@ -29655,7 +29622,7 @@
                     </a14:hiddenLine>
                   </a:ext>
                   <a:ext uri="{AF507438-7753-43E0-B8FC-AC1667EBCBE1}">
-                    <a14:hiddenEffects xmlns:a14="http://schemas.microsoft.com/office/drawing/2010/main">
+                    <a14:hiddenEffects xmlns:a14="http://schemas.microsoft.com/office/drawing/2010/main" xmlns="">
                       <a:effectLst>
                         <a:outerShdw dist="35921" dir="2700000" algn="ctr" rotWithShape="0">
                           <a:schemeClr val="bg2"/>
@@ -29676,10 +29643,10 @@
               <p:nvPr/>
             </p:nvPicPr>
             <p:blipFill>
-              <a:blip r:embed="rId7">
+              <a:blip r:embed="rId7" cstate="print">
                 <a:extLst>
                   <a:ext uri="{28A0092B-C50C-407E-A947-70E740481C1C}">
-                    <a14:useLocalDpi xmlns:a14="http://schemas.microsoft.com/office/drawing/2010/main" val="0"/>
+                    <a14:useLocalDpi xmlns:a14="http://schemas.microsoft.com/office/drawing/2010/main" xmlns="" val="0"/>
                   </a:ext>
                 </a:extLst>
               </a:blip>
@@ -29703,14 +29670,14 @@
               <a:effectLst/>
               <a:extLst>
                 <a:ext uri="{909E8E84-426E-40DD-AFC4-6F175D3DCCD1}">
-                  <a14:hiddenFill xmlns:a14="http://schemas.microsoft.com/office/drawing/2010/main">
+                  <a14:hiddenFill xmlns:a14="http://schemas.microsoft.com/office/drawing/2010/main" xmlns="">
                     <a:solidFill>
                       <a:schemeClr val="accent1"/>
                     </a:solidFill>
                   </a14:hiddenFill>
                 </a:ext>
                 <a:ext uri="{91240B29-F687-4F45-9708-019B960494DF}">
-                  <a14:hiddenLine xmlns:a14="http://schemas.microsoft.com/office/drawing/2010/main" w="9525">
+                  <a14:hiddenLine xmlns:a14="http://schemas.microsoft.com/office/drawing/2010/main" xmlns="" w="9525">
                     <a:solidFill>
                       <a:schemeClr val="tx1"/>
                     </a:solidFill>
@@ -29720,7 +29687,7 @@
                   </a14:hiddenLine>
                 </a:ext>
                 <a:ext uri="{AF507438-7753-43E0-B8FC-AC1667EBCBE1}">
-                  <a14:hiddenEffects xmlns:a14="http://schemas.microsoft.com/office/drawing/2010/main">
+                  <a14:hiddenEffects xmlns:a14="http://schemas.microsoft.com/office/drawing/2010/main" xmlns="">
                     <a:effectLst>
                       <a:outerShdw dist="35921" dir="2700000" algn="ctr" rotWithShape="0">
                         <a:schemeClr val="bg2"/>
@@ -29740,10 +29707,10 @@
               <p:nvPr/>
             </p:nvPicPr>
             <p:blipFill>
-              <a:blip r:embed="rId7">
+              <a:blip r:embed="rId7" cstate="print">
                 <a:extLst>
                   <a:ext uri="{28A0092B-C50C-407E-A947-70E740481C1C}">
-                    <a14:useLocalDpi xmlns:a14="http://schemas.microsoft.com/office/drawing/2010/main" val="0"/>
+                    <a14:useLocalDpi xmlns:a14="http://schemas.microsoft.com/office/drawing/2010/main" xmlns="" val="0"/>
                   </a:ext>
                 </a:extLst>
               </a:blip>
@@ -29767,14 +29734,14 @@
               <a:effectLst/>
               <a:extLst>
                 <a:ext uri="{909E8E84-426E-40DD-AFC4-6F175D3DCCD1}">
-                  <a14:hiddenFill xmlns:a14="http://schemas.microsoft.com/office/drawing/2010/main">
+                  <a14:hiddenFill xmlns:a14="http://schemas.microsoft.com/office/drawing/2010/main" xmlns="">
                     <a:solidFill>
                       <a:schemeClr val="accent1"/>
                     </a:solidFill>
                   </a14:hiddenFill>
                 </a:ext>
                 <a:ext uri="{91240B29-F687-4F45-9708-019B960494DF}">
-                  <a14:hiddenLine xmlns:a14="http://schemas.microsoft.com/office/drawing/2010/main" w="9525">
+                  <a14:hiddenLine xmlns:a14="http://schemas.microsoft.com/office/drawing/2010/main" xmlns="" w="9525">
                     <a:solidFill>
                       <a:schemeClr val="tx1"/>
                     </a:solidFill>
@@ -29784,7 +29751,7 @@
                   </a14:hiddenLine>
                 </a:ext>
                 <a:ext uri="{AF507438-7753-43E0-B8FC-AC1667EBCBE1}">
-                  <a14:hiddenEffects xmlns:a14="http://schemas.microsoft.com/office/drawing/2010/main">
+                  <a14:hiddenEffects xmlns:a14="http://schemas.microsoft.com/office/drawing/2010/main" xmlns="">
                     <a:effectLst>
                       <a:outerShdw dist="35921" dir="2700000" algn="ctr" rotWithShape="0">
                         <a:schemeClr val="bg2"/>
@@ -29804,10 +29771,10 @@
               <p:nvPr/>
             </p:nvPicPr>
             <p:blipFill>
-              <a:blip r:embed="rId7">
+              <a:blip r:embed="rId7" cstate="print">
                 <a:extLst>
                   <a:ext uri="{28A0092B-C50C-407E-A947-70E740481C1C}">
-                    <a14:useLocalDpi xmlns:a14="http://schemas.microsoft.com/office/drawing/2010/main" val="0"/>
+                    <a14:useLocalDpi xmlns:a14="http://schemas.microsoft.com/office/drawing/2010/main" xmlns="" val="0"/>
                   </a:ext>
                 </a:extLst>
               </a:blip>
@@ -29831,14 +29798,14 @@
               <a:effectLst/>
               <a:extLst>
                 <a:ext uri="{909E8E84-426E-40DD-AFC4-6F175D3DCCD1}">
-                  <a14:hiddenFill xmlns:a14="http://schemas.microsoft.com/office/drawing/2010/main">
+                  <a14:hiddenFill xmlns:a14="http://schemas.microsoft.com/office/drawing/2010/main" xmlns="">
                     <a:solidFill>
                       <a:schemeClr val="accent1"/>
                     </a:solidFill>
                   </a14:hiddenFill>
                 </a:ext>
                 <a:ext uri="{91240B29-F687-4F45-9708-019B960494DF}">
-                  <a14:hiddenLine xmlns:a14="http://schemas.microsoft.com/office/drawing/2010/main" w="9525">
+                  <a14:hiddenLine xmlns:a14="http://schemas.microsoft.com/office/drawing/2010/main" xmlns="" w="9525">
                     <a:solidFill>
                       <a:schemeClr val="tx1"/>
                     </a:solidFill>
@@ -29848,7 +29815,7 @@
                   </a14:hiddenLine>
                 </a:ext>
                 <a:ext uri="{AF507438-7753-43E0-B8FC-AC1667EBCBE1}">
-                  <a14:hiddenEffects xmlns:a14="http://schemas.microsoft.com/office/drawing/2010/main">
+                  <a14:hiddenEffects xmlns:a14="http://schemas.microsoft.com/office/drawing/2010/main" xmlns="">
                     <a:effectLst>
                       <a:outerShdw dist="35921" dir="2700000" algn="ctr" rotWithShape="0">
                         <a:schemeClr val="bg2"/>
@@ -29868,10 +29835,10 @@
               <p:nvPr/>
             </p:nvPicPr>
             <p:blipFill>
-              <a:blip r:embed="rId7">
+              <a:blip r:embed="rId7" cstate="print">
                 <a:extLst>
                   <a:ext uri="{28A0092B-C50C-407E-A947-70E740481C1C}">
-                    <a14:useLocalDpi xmlns:a14="http://schemas.microsoft.com/office/drawing/2010/main" val="0"/>
+                    <a14:useLocalDpi xmlns:a14="http://schemas.microsoft.com/office/drawing/2010/main" xmlns="" val="0"/>
                   </a:ext>
                 </a:extLst>
               </a:blip>
@@ -29895,14 +29862,14 @@
               <a:effectLst/>
               <a:extLst>
                 <a:ext uri="{909E8E84-426E-40DD-AFC4-6F175D3DCCD1}">
-                  <a14:hiddenFill xmlns:a14="http://schemas.microsoft.com/office/drawing/2010/main">
+                  <a14:hiddenFill xmlns:a14="http://schemas.microsoft.com/office/drawing/2010/main" xmlns="">
                     <a:solidFill>
                       <a:schemeClr val="accent1"/>
                     </a:solidFill>
                   </a14:hiddenFill>
                 </a:ext>
                 <a:ext uri="{91240B29-F687-4F45-9708-019B960494DF}">
-                  <a14:hiddenLine xmlns:a14="http://schemas.microsoft.com/office/drawing/2010/main" w="9525">
+                  <a14:hiddenLine xmlns:a14="http://schemas.microsoft.com/office/drawing/2010/main" xmlns="" w="9525">
                     <a:solidFill>
                       <a:schemeClr val="tx1"/>
                     </a:solidFill>
@@ -29912,7 +29879,7 @@
                   </a14:hiddenLine>
                 </a:ext>
                 <a:ext uri="{AF507438-7753-43E0-B8FC-AC1667EBCBE1}">
-                  <a14:hiddenEffects xmlns:a14="http://schemas.microsoft.com/office/drawing/2010/main">
+                  <a14:hiddenEffects xmlns:a14="http://schemas.microsoft.com/office/drawing/2010/main" xmlns="">
                     <a:effectLst>
                       <a:outerShdw dist="35921" dir="2700000" algn="ctr" rotWithShape="0">
                         <a:schemeClr val="bg2"/>
@@ -30116,10 +30083,10 @@
                 <p:nvPr/>
               </p:nvPicPr>
               <p:blipFill>
-                <a:blip r:embed="rId4">
+                <a:blip r:embed="rId4" cstate="print">
                   <a:extLst>
                     <a:ext uri="{28A0092B-C50C-407E-A947-70E740481C1C}">
-                      <a14:useLocalDpi xmlns:a14="http://schemas.microsoft.com/office/drawing/2010/main" val="0"/>
+                      <a14:useLocalDpi xmlns:a14="http://schemas.microsoft.com/office/drawing/2010/main" xmlns="" val="0"/>
                     </a:ext>
                   </a:extLst>
                 </a:blip>
@@ -30143,14 +30110,14 @@
                 <a:effectLst/>
                 <a:extLst>
                   <a:ext uri="{909E8E84-426E-40DD-AFC4-6F175D3DCCD1}">
-                    <a14:hiddenFill xmlns:a14="http://schemas.microsoft.com/office/drawing/2010/main">
+                    <a14:hiddenFill xmlns:a14="http://schemas.microsoft.com/office/drawing/2010/main" xmlns="">
                       <a:solidFill>
                         <a:schemeClr val="accent1"/>
                       </a:solidFill>
                     </a14:hiddenFill>
                   </a:ext>
                   <a:ext uri="{91240B29-F687-4F45-9708-019B960494DF}">
-                    <a14:hiddenLine xmlns:a14="http://schemas.microsoft.com/office/drawing/2010/main" w="9525">
+                    <a14:hiddenLine xmlns:a14="http://schemas.microsoft.com/office/drawing/2010/main" xmlns="" w="9525">
                       <a:solidFill>
                         <a:schemeClr val="tx1"/>
                       </a:solidFill>
@@ -30160,7 +30127,7 @@
                     </a14:hiddenLine>
                   </a:ext>
                   <a:ext uri="{AF507438-7753-43E0-B8FC-AC1667EBCBE1}">
-                    <a14:hiddenEffects xmlns:a14="http://schemas.microsoft.com/office/drawing/2010/main">
+                    <a14:hiddenEffects xmlns:a14="http://schemas.microsoft.com/office/drawing/2010/main" xmlns="">
                       <a:effectLst>
                         <a:outerShdw dist="35921" dir="2700000" algn="ctr" rotWithShape="0">
                           <a:schemeClr val="bg2"/>
@@ -30225,10 +30192,10 @@
                 <p:nvPr/>
               </p:nvPicPr>
               <p:blipFill>
-                <a:blip r:embed="rId6">
+                <a:blip r:embed="rId6" cstate="print">
                   <a:extLst>
                     <a:ext uri="{28A0092B-C50C-407E-A947-70E740481C1C}">
-                      <a14:useLocalDpi xmlns:a14="http://schemas.microsoft.com/office/drawing/2010/main" val="0"/>
+                      <a14:useLocalDpi xmlns:a14="http://schemas.microsoft.com/office/drawing/2010/main" xmlns="" val="0"/>
                     </a:ext>
                   </a:extLst>
                 </a:blip>
@@ -30252,14 +30219,14 @@
                 <a:effectLst/>
                 <a:extLst>
                   <a:ext uri="{909E8E84-426E-40DD-AFC4-6F175D3DCCD1}">
-                    <a14:hiddenFill xmlns:a14="http://schemas.microsoft.com/office/drawing/2010/main">
+                    <a14:hiddenFill xmlns:a14="http://schemas.microsoft.com/office/drawing/2010/main" xmlns="">
                       <a:solidFill>
                         <a:schemeClr val="accent1"/>
                       </a:solidFill>
                     </a14:hiddenFill>
                   </a:ext>
                   <a:ext uri="{91240B29-F687-4F45-9708-019B960494DF}">
-                    <a14:hiddenLine xmlns:a14="http://schemas.microsoft.com/office/drawing/2010/main" w="9525">
+                    <a14:hiddenLine xmlns:a14="http://schemas.microsoft.com/office/drawing/2010/main" xmlns="" w="9525">
                       <a:solidFill>
                         <a:schemeClr val="tx1"/>
                       </a:solidFill>
@@ -30269,7 +30236,7 @@
                     </a14:hiddenLine>
                   </a:ext>
                   <a:ext uri="{AF507438-7753-43E0-B8FC-AC1667EBCBE1}">
-                    <a14:hiddenEffects xmlns:a14="http://schemas.microsoft.com/office/drawing/2010/main">
+                    <a14:hiddenEffects xmlns:a14="http://schemas.microsoft.com/office/drawing/2010/main" xmlns="">
                       <a:effectLst>
                         <a:outerShdw dist="35921" dir="2700000" algn="ctr" rotWithShape="0">
                           <a:schemeClr val="bg2"/>
@@ -30290,10 +30257,10 @@
               <p:nvPr/>
             </p:nvPicPr>
             <p:blipFill>
-              <a:blip r:embed="rId7">
+              <a:blip r:embed="rId7" cstate="print">
                 <a:extLst>
                   <a:ext uri="{28A0092B-C50C-407E-A947-70E740481C1C}">
-                    <a14:useLocalDpi xmlns:a14="http://schemas.microsoft.com/office/drawing/2010/main" val="0"/>
+                    <a14:useLocalDpi xmlns:a14="http://schemas.microsoft.com/office/drawing/2010/main" xmlns="" val="0"/>
                   </a:ext>
                 </a:extLst>
               </a:blip>
@@ -30317,14 +30284,14 @@
               <a:effectLst/>
               <a:extLst>
                 <a:ext uri="{909E8E84-426E-40DD-AFC4-6F175D3DCCD1}">
-                  <a14:hiddenFill xmlns:a14="http://schemas.microsoft.com/office/drawing/2010/main">
+                  <a14:hiddenFill xmlns:a14="http://schemas.microsoft.com/office/drawing/2010/main" xmlns="">
                     <a:solidFill>
                       <a:schemeClr val="accent1"/>
                     </a:solidFill>
                   </a14:hiddenFill>
                 </a:ext>
                 <a:ext uri="{91240B29-F687-4F45-9708-019B960494DF}">
-                  <a14:hiddenLine xmlns:a14="http://schemas.microsoft.com/office/drawing/2010/main" w="9525">
+                  <a14:hiddenLine xmlns:a14="http://schemas.microsoft.com/office/drawing/2010/main" xmlns="" w="9525">
                     <a:solidFill>
                       <a:schemeClr val="tx1"/>
                     </a:solidFill>
@@ -30334,7 +30301,7 @@
                   </a14:hiddenLine>
                 </a:ext>
                 <a:ext uri="{AF507438-7753-43E0-B8FC-AC1667EBCBE1}">
-                  <a14:hiddenEffects xmlns:a14="http://schemas.microsoft.com/office/drawing/2010/main">
+                  <a14:hiddenEffects xmlns:a14="http://schemas.microsoft.com/office/drawing/2010/main" xmlns="">
                     <a:effectLst>
                       <a:outerShdw dist="35921" dir="2700000" algn="ctr" rotWithShape="0">
                         <a:schemeClr val="bg2"/>
@@ -30354,10 +30321,10 @@
               <p:nvPr/>
             </p:nvPicPr>
             <p:blipFill>
-              <a:blip r:embed="rId7">
+              <a:blip r:embed="rId7" cstate="print">
                 <a:extLst>
                   <a:ext uri="{28A0092B-C50C-407E-A947-70E740481C1C}">
-                    <a14:useLocalDpi xmlns:a14="http://schemas.microsoft.com/office/drawing/2010/main" val="0"/>
+                    <a14:useLocalDpi xmlns:a14="http://schemas.microsoft.com/office/drawing/2010/main" xmlns="" val="0"/>
                   </a:ext>
                 </a:extLst>
               </a:blip>
@@ -30381,14 +30348,14 @@
               <a:effectLst/>
               <a:extLst>
                 <a:ext uri="{909E8E84-426E-40DD-AFC4-6F175D3DCCD1}">
-                  <a14:hiddenFill xmlns:a14="http://schemas.microsoft.com/office/drawing/2010/main">
+                  <a14:hiddenFill xmlns:a14="http://schemas.microsoft.com/office/drawing/2010/main" xmlns="">
                     <a:solidFill>
                       <a:schemeClr val="accent1"/>
                     </a:solidFill>
                   </a14:hiddenFill>
                 </a:ext>
                 <a:ext uri="{91240B29-F687-4F45-9708-019B960494DF}">
-                  <a14:hiddenLine xmlns:a14="http://schemas.microsoft.com/office/drawing/2010/main" w="9525">
+                  <a14:hiddenLine xmlns:a14="http://schemas.microsoft.com/office/drawing/2010/main" xmlns="" w="9525">
                     <a:solidFill>
                       <a:schemeClr val="tx1"/>
                     </a:solidFill>
@@ -30398,7 +30365,7 @@
                   </a14:hiddenLine>
                 </a:ext>
                 <a:ext uri="{AF507438-7753-43E0-B8FC-AC1667EBCBE1}">
-                  <a14:hiddenEffects xmlns:a14="http://schemas.microsoft.com/office/drawing/2010/main">
+                  <a14:hiddenEffects xmlns:a14="http://schemas.microsoft.com/office/drawing/2010/main" xmlns="">
                     <a:effectLst>
                       <a:outerShdw dist="35921" dir="2700000" algn="ctr" rotWithShape="0">
                         <a:schemeClr val="bg2"/>
@@ -30418,10 +30385,10 @@
               <p:nvPr/>
             </p:nvPicPr>
             <p:blipFill>
-              <a:blip r:embed="rId7">
+              <a:blip r:embed="rId7" cstate="print">
                 <a:extLst>
                   <a:ext uri="{28A0092B-C50C-407E-A947-70E740481C1C}">
-                    <a14:useLocalDpi xmlns:a14="http://schemas.microsoft.com/office/drawing/2010/main" val="0"/>
+                    <a14:useLocalDpi xmlns:a14="http://schemas.microsoft.com/office/drawing/2010/main" xmlns="" val="0"/>
                   </a:ext>
                 </a:extLst>
               </a:blip>
@@ -30445,14 +30412,14 @@
               <a:effectLst/>
               <a:extLst>
                 <a:ext uri="{909E8E84-426E-40DD-AFC4-6F175D3DCCD1}">
-                  <a14:hiddenFill xmlns:a14="http://schemas.microsoft.com/office/drawing/2010/main">
+                  <a14:hiddenFill xmlns:a14="http://schemas.microsoft.com/office/drawing/2010/main" xmlns="">
                     <a:solidFill>
                       <a:schemeClr val="accent1"/>
                     </a:solidFill>
                   </a14:hiddenFill>
                 </a:ext>
                 <a:ext uri="{91240B29-F687-4F45-9708-019B960494DF}">
-                  <a14:hiddenLine xmlns:a14="http://schemas.microsoft.com/office/drawing/2010/main" w="9525">
+                  <a14:hiddenLine xmlns:a14="http://schemas.microsoft.com/office/drawing/2010/main" xmlns="" w="9525">
                     <a:solidFill>
                       <a:schemeClr val="tx1"/>
                     </a:solidFill>
@@ -30462,7 +30429,7 @@
                   </a14:hiddenLine>
                 </a:ext>
                 <a:ext uri="{AF507438-7753-43E0-B8FC-AC1667EBCBE1}">
-                  <a14:hiddenEffects xmlns:a14="http://schemas.microsoft.com/office/drawing/2010/main">
+                  <a14:hiddenEffects xmlns:a14="http://schemas.microsoft.com/office/drawing/2010/main" xmlns="">
                     <a:effectLst>
                       <a:outerShdw dist="35921" dir="2700000" algn="ctr" rotWithShape="0">
                         <a:schemeClr val="bg2"/>
@@ -30483,10 +30450,10 @@
             <p:nvPr/>
           </p:nvPicPr>
           <p:blipFill>
-            <a:blip r:embed="rId8">
+            <a:blip r:embed="rId8" cstate="print">
               <a:extLst>
                 <a:ext uri="{28A0092B-C50C-407E-A947-70E740481C1C}">
-                  <a14:useLocalDpi xmlns:a14="http://schemas.microsoft.com/office/drawing/2010/main" val="0"/>
+                  <a14:useLocalDpi xmlns:a14="http://schemas.microsoft.com/office/drawing/2010/main" xmlns="" val="0"/>
                 </a:ext>
               </a:extLst>
             </a:blip>
@@ -30510,14 +30477,14 @@
             <a:effectLst/>
             <a:extLst>
               <a:ext uri="{909E8E84-426E-40DD-AFC4-6F175D3DCCD1}">
-                <a14:hiddenFill xmlns:a14="http://schemas.microsoft.com/office/drawing/2010/main">
+                <a14:hiddenFill xmlns:a14="http://schemas.microsoft.com/office/drawing/2010/main" xmlns="">
                   <a:solidFill>
                     <a:schemeClr val="accent1"/>
                   </a:solidFill>
                 </a14:hiddenFill>
               </a:ext>
               <a:ext uri="{91240B29-F687-4F45-9708-019B960494DF}">
-                <a14:hiddenLine xmlns:a14="http://schemas.microsoft.com/office/drawing/2010/main" w="9525">
+                <a14:hiddenLine xmlns:a14="http://schemas.microsoft.com/office/drawing/2010/main" xmlns="" w="9525">
                   <a:solidFill>
                     <a:schemeClr val="tx1"/>
                   </a:solidFill>
@@ -30527,7 +30494,7 @@
                 </a14:hiddenLine>
               </a:ext>
               <a:ext uri="{AF507438-7753-43E0-B8FC-AC1667EBCBE1}">
-                <a14:hiddenEffects xmlns:a14="http://schemas.microsoft.com/office/drawing/2010/main">
+                <a14:hiddenEffects xmlns:a14="http://schemas.microsoft.com/office/drawing/2010/main" xmlns="">
                   <a:effectLst>
                     <a:outerShdw dist="35921" dir="2700000" algn="ctr" rotWithShape="0">
                       <a:schemeClr val="bg2"/>
@@ -30547,10 +30514,10 @@
             <p:nvPr/>
           </p:nvPicPr>
           <p:blipFill>
-            <a:blip r:embed="rId7">
+            <a:blip r:embed="rId7" cstate="print">
               <a:extLst>
                 <a:ext uri="{28A0092B-C50C-407E-A947-70E740481C1C}">
-                  <a14:useLocalDpi xmlns:a14="http://schemas.microsoft.com/office/drawing/2010/main" val="0"/>
+                  <a14:useLocalDpi xmlns:a14="http://schemas.microsoft.com/office/drawing/2010/main" xmlns="" val="0"/>
                 </a:ext>
               </a:extLst>
             </a:blip>
@@ -30574,14 +30541,14 @@
             <a:effectLst/>
             <a:extLst>
               <a:ext uri="{909E8E84-426E-40DD-AFC4-6F175D3DCCD1}">
-                <a14:hiddenFill xmlns:a14="http://schemas.microsoft.com/office/drawing/2010/main">
+                <a14:hiddenFill xmlns:a14="http://schemas.microsoft.com/office/drawing/2010/main" xmlns="">
                   <a:solidFill>
                     <a:schemeClr val="accent1"/>
                   </a:solidFill>
                 </a14:hiddenFill>
               </a:ext>
               <a:ext uri="{91240B29-F687-4F45-9708-019B960494DF}">
-                <a14:hiddenLine xmlns:a14="http://schemas.microsoft.com/office/drawing/2010/main" w="9525">
+                <a14:hiddenLine xmlns:a14="http://schemas.microsoft.com/office/drawing/2010/main" xmlns="" w="9525">
                   <a:solidFill>
                     <a:schemeClr val="tx1"/>
                   </a:solidFill>
@@ -30591,7 +30558,7 @@
                 </a14:hiddenLine>
               </a:ext>
               <a:ext uri="{AF507438-7753-43E0-B8FC-AC1667EBCBE1}">
-                <a14:hiddenEffects xmlns:a14="http://schemas.microsoft.com/office/drawing/2010/main">
+                <a14:hiddenEffects xmlns:a14="http://schemas.microsoft.com/office/drawing/2010/main" xmlns="">
                   <a:effectLst>
                     <a:outerShdw dist="35921" dir="2700000" algn="ctr" rotWithShape="0">
                       <a:schemeClr val="bg2"/>
@@ -30611,10 +30578,10 @@
             <p:nvPr/>
           </p:nvPicPr>
           <p:blipFill>
-            <a:blip r:embed="rId3">
+            <a:blip r:embed="rId3" cstate="print">
               <a:extLst>
                 <a:ext uri="{28A0092B-C50C-407E-A947-70E740481C1C}">
-                  <a14:useLocalDpi xmlns:a14="http://schemas.microsoft.com/office/drawing/2010/main" val="0"/>
+                  <a14:useLocalDpi xmlns:a14="http://schemas.microsoft.com/office/drawing/2010/main" xmlns="" val="0"/>
                 </a:ext>
               </a:extLst>
             </a:blip>
@@ -30638,14 +30605,14 @@
             <a:effectLst/>
             <a:extLst>
               <a:ext uri="{909E8E84-426E-40DD-AFC4-6F175D3DCCD1}">
-                <a14:hiddenFill xmlns:a14="http://schemas.microsoft.com/office/drawing/2010/main">
+                <a14:hiddenFill xmlns:a14="http://schemas.microsoft.com/office/drawing/2010/main" xmlns="">
                   <a:solidFill>
                     <a:schemeClr val="accent1"/>
                   </a:solidFill>
                 </a14:hiddenFill>
               </a:ext>
               <a:ext uri="{91240B29-F687-4F45-9708-019B960494DF}">
-                <a14:hiddenLine xmlns:a14="http://schemas.microsoft.com/office/drawing/2010/main" w="9525">
+                <a14:hiddenLine xmlns:a14="http://schemas.microsoft.com/office/drawing/2010/main" xmlns="" w="9525">
                   <a:solidFill>
                     <a:schemeClr val="tx1"/>
                   </a:solidFill>
@@ -30655,7 +30622,7 @@
                 </a14:hiddenLine>
               </a:ext>
               <a:ext uri="{AF507438-7753-43E0-B8FC-AC1667EBCBE1}">
-                <a14:hiddenEffects xmlns:a14="http://schemas.microsoft.com/office/drawing/2010/main">
+                <a14:hiddenEffects xmlns:a14="http://schemas.microsoft.com/office/drawing/2010/main" xmlns="">
                   <a:effectLst>
                     <a:outerShdw dist="35921" dir="2700000" algn="ctr" rotWithShape="0">
                       <a:schemeClr val="bg2"/>
@@ -30858,10 +30825,10 @@
                 <p:nvPr/>
               </p:nvPicPr>
               <p:blipFill>
-                <a:blip r:embed="rId3">
+                <a:blip r:embed="rId3" cstate="print">
                   <a:extLst>
                     <a:ext uri="{28A0092B-C50C-407E-A947-70E740481C1C}">
-                      <a14:useLocalDpi xmlns:a14="http://schemas.microsoft.com/office/drawing/2010/main" val="0"/>
+                      <a14:useLocalDpi xmlns:a14="http://schemas.microsoft.com/office/drawing/2010/main" xmlns="" val="0"/>
                     </a:ext>
                   </a:extLst>
                 </a:blip>
@@ -30885,14 +30852,14 @@
                 <a:effectLst/>
                 <a:extLst>
                   <a:ext uri="{909E8E84-426E-40DD-AFC4-6F175D3DCCD1}">
-                    <a14:hiddenFill xmlns:a14="http://schemas.microsoft.com/office/drawing/2010/main">
+                    <a14:hiddenFill xmlns:a14="http://schemas.microsoft.com/office/drawing/2010/main" xmlns="">
                       <a:solidFill>
                         <a:schemeClr val="accent1"/>
                       </a:solidFill>
                     </a14:hiddenFill>
                   </a:ext>
                   <a:ext uri="{91240B29-F687-4F45-9708-019B960494DF}">
-                    <a14:hiddenLine xmlns:a14="http://schemas.microsoft.com/office/drawing/2010/main" w="9525">
+                    <a14:hiddenLine xmlns:a14="http://schemas.microsoft.com/office/drawing/2010/main" xmlns="" w="9525">
                       <a:solidFill>
                         <a:schemeClr val="tx1"/>
                       </a:solidFill>
@@ -30902,7 +30869,7 @@
                     </a14:hiddenLine>
                   </a:ext>
                   <a:ext uri="{AF507438-7753-43E0-B8FC-AC1667EBCBE1}">
-                    <a14:hiddenEffects xmlns:a14="http://schemas.microsoft.com/office/drawing/2010/main">
+                    <a14:hiddenEffects xmlns:a14="http://schemas.microsoft.com/office/drawing/2010/main" xmlns="">
                       <a:effectLst>
                         <a:outerShdw dist="35921" dir="2700000" algn="ctr" rotWithShape="0">
                           <a:schemeClr val="bg2"/>
@@ -30922,10 +30889,10 @@
                 <p:nvPr/>
               </p:nvPicPr>
               <p:blipFill>
-                <a:blip r:embed="rId4">
+                <a:blip r:embed="rId4" cstate="print">
                   <a:extLst>
                     <a:ext uri="{28A0092B-C50C-407E-A947-70E740481C1C}">
-                      <a14:useLocalDpi xmlns:a14="http://schemas.microsoft.com/office/drawing/2010/main" val="0"/>
+                      <a14:useLocalDpi xmlns:a14="http://schemas.microsoft.com/office/drawing/2010/main" xmlns="" val="0"/>
                     </a:ext>
                   </a:extLst>
                 </a:blip>
@@ -30949,14 +30916,14 @@
                 <a:effectLst/>
                 <a:extLst>
                   <a:ext uri="{909E8E84-426E-40DD-AFC4-6F175D3DCCD1}">
-                    <a14:hiddenFill xmlns:a14="http://schemas.microsoft.com/office/drawing/2010/main">
+                    <a14:hiddenFill xmlns:a14="http://schemas.microsoft.com/office/drawing/2010/main" xmlns="">
                       <a:solidFill>
                         <a:schemeClr val="accent1"/>
                       </a:solidFill>
                     </a14:hiddenFill>
                   </a:ext>
                   <a:ext uri="{91240B29-F687-4F45-9708-019B960494DF}">
-                    <a14:hiddenLine xmlns:a14="http://schemas.microsoft.com/office/drawing/2010/main" w="9525">
+                    <a14:hiddenLine xmlns:a14="http://schemas.microsoft.com/office/drawing/2010/main" xmlns="" w="9525">
                       <a:solidFill>
                         <a:schemeClr val="tx1"/>
                       </a:solidFill>
@@ -30966,7 +30933,7 @@
                     </a14:hiddenLine>
                   </a:ext>
                   <a:ext uri="{AF507438-7753-43E0-B8FC-AC1667EBCBE1}">
-                    <a14:hiddenEffects xmlns:a14="http://schemas.microsoft.com/office/drawing/2010/main">
+                    <a14:hiddenEffects xmlns:a14="http://schemas.microsoft.com/office/drawing/2010/main" xmlns="">
                       <a:effectLst>
                         <a:outerShdw dist="35921" dir="2700000" algn="ctr" rotWithShape="0">
                           <a:schemeClr val="bg2"/>
@@ -31046,10 +31013,10 @@
                 <p:nvPr/>
               </p:nvPicPr>
               <p:blipFill>
-                <a:blip r:embed="rId7">
+                <a:blip r:embed="rId7" cstate="print">
                   <a:extLst>
                     <a:ext uri="{28A0092B-C50C-407E-A947-70E740481C1C}">
-                      <a14:useLocalDpi xmlns:a14="http://schemas.microsoft.com/office/drawing/2010/main" val="0"/>
+                      <a14:useLocalDpi xmlns:a14="http://schemas.microsoft.com/office/drawing/2010/main" xmlns="" val="0"/>
                     </a:ext>
                   </a:extLst>
                 </a:blip>
@@ -31073,14 +31040,14 @@
                 <a:effectLst/>
                 <a:extLst>
                   <a:ext uri="{909E8E84-426E-40DD-AFC4-6F175D3DCCD1}">
-                    <a14:hiddenFill xmlns:a14="http://schemas.microsoft.com/office/drawing/2010/main">
+                    <a14:hiddenFill xmlns:a14="http://schemas.microsoft.com/office/drawing/2010/main" xmlns="">
                       <a:solidFill>
                         <a:schemeClr val="accent1"/>
                       </a:solidFill>
                     </a14:hiddenFill>
                   </a:ext>
                   <a:ext uri="{91240B29-F687-4F45-9708-019B960494DF}">
-                    <a14:hiddenLine xmlns:a14="http://schemas.microsoft.com/office/drawing/2010/main" w="9525">
+                    <a14:hiddenLine xmlns:a14="http://schemas.microsoft.com/office/drawing/2010/main" xmlns="" w="9525">
                       <a:solidFill>
                         <a:schemeClr val="tx1"/>
                       </a:solidFill>
@@ -31090,7 +31057,7 @@
                     </a14:hiddenLine>
                   </a:ext>
                   <a:ext uri="{AF507438-7753-43E0-B8FC-AC1667EBCBE1}">
-                    <a14:hiddenEffects xmlns:a14="http://schemas.microsoft.com/office/drawing/2010/main">
+                    <a14:hiddenEffects xmlns:a14="http://schemas.microsoft.com/office/drawing/2010/main" xmlns="">
                       <a:effectLst>
                         <a:outerShdw dist="35921" dir="2700000" algn="ctr" rotWithShape="0">
                           <a:schemeClr val="bg2"/>
@@ -31110,10 +31077,10 @@
                 <p:nvPr/>
               </p:nvPicPr>
               <p:blipFill>
-                <a:blip r:embed="rId7">
+                <a:blip r:embed="rId7" cstate="print">
                   <a:extLst>
                     <a:ext uri="{28A0092B-C50C-407E-A947-70E740481C1C}">
-                      <a14:useLocalDpi xmlns:a14="http://schemas.microsoft.com/office/drawing/2010/main" val="0"/>
+                      <a14:useLocalDpi xmlns:a14="http://schemas.microsoft.com/office/drawing/2010/main" xmlns="" val="0"/>
                     </a:ext>
                   </a:extLst>
                 </a:blip>
@@ -31137,14 +31104,14 @@
                 <a:effectLst/>
                 <a:extLst>
                   <a:ext uri="{909E8E84-426E-40DD-AFC4-6F175D3DCCD1}">
-                    <a14:hiddenFill xmlns:a14="http://schemas.microsoft.com/office/drawing/2010/main">
+                    <a14:hiddenFill xmlns:a14="http://schemas.microsoft.com/office/drawing/2010/main" xmlns="">
                       <a:solidFill>
                         <a:schemeClr val="accent1"/>
                       </a:solidFill>
                     </a14:hiddenFill>
                   </a:ext>
                   <a:ext uri="{91240B29-F687-4F45-9708-019B960494DF}">
-                    <a14:hiddenLine xmlns:a14="http://schemas.microsoft.com/office/drawing/2010/main" w="9525">
+                    <a14:hiddenLine xmlns:a14="http://schemas.microsoft.com/office/drawing/2010/main" xmlns="" w="9525">
                       <a:solidFill>
                         <a:schemeClr val="tx1"/>
                       </a:solidFill>
@@ -31154,7 +31121,7 @@
                     </a14:hiddenLine>
                   </a:ext>
                   <a:ext uri="{AF507438-7753-43E0-B8FC-AC1667EBCBE1}">
-                    <a14:hiddenEffects xmlns:a14="http://schemas.microsoft.com/office/drawing/2010/main">
+                    <a14:hiddenEffects xmlns:a14="http://schemas.microsoft.com/office/drawing/2010/main" xmlns="">
                       <a:effectLst>
                         <a:outerShdw dist="35921" dir="2700000" algn="ctr" rotWithShape="0">
                           <a:schemeClr val="bg2"/>
@@ -31174,10 +31141,10 @@
                 <p:nvPr/>
               </p:nvPicPr>
               <p:blipFill>
-                <a:blip r:embed="rId6">
+                <a:blip r:embed="rId6" cstate="print">
                   <a:extLst>
                     <a:ext uri="{28A0092B-C50C-407E-A947-70E740481C1C}">
-                      <a14:useLocalDpi xmlns:a14="http://schemas.microsoft.com/office/drawing/2010/main" val="0"/>
+                      <a14:useLocalDpi xmlns:a14="http://schemas.microsoft.com/office/drawing/2010/main" xmlns="" val="0"/>
                     </a:ext>
                   </a:extLst>
                 </a:blip>
@@ -31201,14 +31168,14 @@
                 <a:effectLst/>
                 <a:extLst>
                   <a:ext uri="{909E8E84-426E-40DD-AFC4-6F175D3DCCD1}">
-                    <a14:hiddenFill xmlns:a14="http://schemas.microsoft.com/office/drawing/2010/main">
+                    <a14:hiddenFill xmlns:a14="http://schemas.microsoft.com/office/drawing/2010/main" xmlns="">
                       <a:solidFill>
                         <a:schemeClr val="accent1"/>
                       </a:solidFill>
                     </a14:hiddenFill>
                   </a:ext>
                   <a:ext uri="{91240B29-F687-4F45-9708-019B960494DF}">
-                    <a14:hiddenLine xmlns:a14="http://schemas.microsoft.com/office/drawing/2010/main" w="9525">
+                    <a14:hiddenLine xmlns:a14="http://schemas.microsoft.com/office/drawing/2010/main" xmlns="" w="9525">
                       <a:solidFill>
                         <a:schemeClr val="tx1"/>
                       </a:solidFill>
@@ -31218,7 +31185,7 @@
                     </a14:hiddenLine>
                   </a:ext>
                   <a:ext uri="{AF507438-7753-43E0-B8FC-AC1667EBCBE1}">
-                    <a14:hiddenEffects xmlns:a14="http://schemas.microsoft.com/office/drawing/2010/main">
+                    <a14:hiddenEffects xmlns:a14="http://schemas.microsoft.com/office/drawing/2010/main" xmlns="">
                       <a:effectLst>
                         <a:outerShdw dist="35921" dir="2700000" algn="ctr" rotWithShape="0">
                           <a:schemeClr val="bg2"/>
@@ -31238,10 +31205,10 @@
                 <p:nvPr/>
               </p:nvPicPr>
               <p:blipFill>
-                <a:blip r:embed="rId6">
+                <a:blip r:embed="rId6" cstate="print">
                   <a:extLst>
                     <a:ext uri="{28A0092B-C50C-407E-A947-70E740481C1C}">
-                      <a14:useLocalDpi xmlns:a14="http://schemas.microsoft.com/office/drawing/2010/main" val="0"/>
+                      <a14:useLocalDpi xmlns:a14="http://schemas.microsoft.com/office/drawing/2010/main" xmlns="" val="0"/>
                     </a:ext>
                   </a:extLst>
                 </a:blip>
@@ -31265,14 +31232,14 @@
                 <a:effectLst/>
                 <a:extLst>
                   <a:ext uri="{909E8E84-426E-40DD-AFC4-6F175D3DCCD1}">
-                    <a14:hiddenFill xmlns:a14="http://schemas.microsoft.com/office/drawing/2010/main">
+                    <a14:hiddenFill xmlns:a14="http://schemas.microsoft.com/office/drawing/2010/main" xmlns="">
                       <a:solidFill>
                         <a:schemeClr val="accent1"/>
                       </a:solidFill>
                     </a14:hiddenFill>
                   </a:ext>
                   <a:ext uri="{91240B29-F687-4F45-9708-019B960494DF}">
-                    <a14:hiddenLine xmlns:a14="http://schemas.microsoft.com/office/drawing/2010/main" w="9525">
+                    <a14:hiddenLine xmlns:a14="http://schemas.microsoft.com/office/drawing/2010/main" xmlns="" w="9525">
                       <a:solidFill>
                         <a:schemeClr val="tx1"/>
                       </a:solidFill>
@@ -31282,7 +31249,7 @@
                     </a14:hiddenLine>
                   </a:ext>
                   <a:ext uri="{AF507438-7753-43E0-B8FC-AC1667EBCBE1}">
-                    <a14:hiddenEffects xmlns:a14="http://schemas.microsoft.com/office/drawing/2010/main">
+                    <a14:hiddenEffects xmlns:a14="http://schemas.microsoft.com/office/drawing/2010/main" xmlns="">
                       <a:effectLst>
                         <a:outerShdw dist="35921" dir="2700000" algn="ctr" rotWithShape="0">
                           <a:schemeClr val="bg2"/>
@@ -31302,10 +31269,10 @@
                 <p:nvPr/>
               </p:nvPicPr>
               <p:blipFill>
-                <a:blip r:embed="rId6">
+                <a:blip r:embed="rId6" cstate="print">
                   <a:extLst>
                     <a:ext uri="{28A0092B-C50C-407E-A947-70E740481C1C}">
-                      <a14:useLocalDpi xmlns:a14="http://schemas.microsoft.com/office/drawing/2010/main" val="0"/>
+                      <a14:useLocalDpi xmlns:a14="http://schemas.microsoft.com/office/drawing/2010/main" xmlns="" val="0"/>
                     </a:ext>
                   </a:extLst>
                 </a:blip>
@@ -31329,14 +31296,14 @@
                 <a:effectLst/>
                 <a:extLst>
                   <a:ext uri="{909E8E84-426E-40DD-AFC4-6F175D3DCCD1}">
-                    <a14:hiddenFill xmlns:a14="http://schemas.microsoft.com/office/drawing/2010/main">
+                    <a14:hiddenFill xmlns:a14="http://schemas.microsoft.com/office/drawing/2010/main" xmlns="">
                       <a:solidFill>
                         <a:schemeClr val="accent1"/>
                       </a:solidFill>
                     </a14:hiddenFill>
                   </a:ext>
                   <a:ext uri="{91240B29-F687-4F45-9708-019B960494DF}">
-                    <a14:hiddenLine xmlns:a14="http://schemas.microsoft.com/office/drawing/2010/main" w="9525">
+                    <a14:hiddenLine xmlns:a14="http://schemas.microsoft.com/office/drawing/2010/main" xmlns="" w="9525">
                       <a:solidFill>
                         <a:schemeClr val="tx1"/>
                       </a:solidFill>
@@ -31346,7 +31313,7 @@
                     </a14:hiddenLine>
                   </a:ext>
                   <a:ext uri="{AF507438-7753-43E0-B8FC-AC1667EBCBE1}">
-                    <a14:hiddenEffects xmlns:a14="http://schemas.microsoft.com/office/drawing/2010/main">
+                    <a14:hiddenEffects xmlns:a14="http://schemas.microsoft.com/office/drawing/2010/main" xmlns="">
                       <a:effectLst>
                         <a:outerShdw dist="35921" dir="2700000" algn="ctr" rotWithShape="0">
                           <a:schemeClr val="bg2"/>
@@ -31368,10 +31335,10 @@
             <p:nvPr/>
           </p:nvPicPr>
           <p:blipFill>
-            <a:blip r:embed="rId6">
+            <a:blip r:embed="rId6" cstate="print">
               <a:extLst>
                 <a:ext uri="{28A0092B-C50C-407E-A947-70E740481C1C}">
-                  <a14:useLocalDpi xmlns:a14="http://schemas.microsoft.com/office/drawing/2010/main" val="0"/>
+                  <a14:useLocalDpi xmlns:a14="http://schemas.microsoft.com/office/drawing/2010/main" xmlns="" val="0"/>
                 </a:ext>
               </a:extLst>
             </a:blip>
@@ -31395,14 +31362,14 @@
             <a:effectLst/>
             <a:extLst>
               <a:ext uri="{909E8E84-426E-40DD-AFC4-6F175D3DCCD1}">
-                <a14:hiddenFill xmlns:a14="http://schemas.microsoft.com/office/drawing/2010/main">
+                <a14:hiddenFill xmlns:a14="http://schemas.microsoft.com/office/drawing/2010/main" xmlns="">
                   <a:solidFill>
                     <a:schemeClr val="accent1"/>
                   </a:solidFill>
                 </a14:hiddenFill>
               </a:ext>
               <a:ext uri="{91240B29-F687-4F45-9708-019B960494DF}">
-                <a14:hiddenLine xmlns:a14="http://schemas.microsoft.com/office/drawing/2010/main" w="9525">
+                <a14:hiddenLine xmlns:a14="http://schemas.microsoft.com/office/drawing/2010/main" xmlns="" w="9525">
                   <a:solidFill>
                     <a:schemeClr val="tx1"/>
                   </a:solidFill>
@@ -31412,7 +31379,7 @@
                 </a14:hiddenLine>
               </a:ext>
               <a:ext uri="{AF507438-7753-43E0-B8FC-AC1667EBCBE1}">
-                <a14:hiddenEffects xmlns:a14="http://schemas.microsoft.com/office/drawing/2010/main">
+                <a14:hiddenEffects xmlns:a14="http://schemas.microsoft.com/office/drawing/2010/main" xmlns="">
                   <a:effectLst>
                     <a:outerShdw dist="35921" dir="2700000" algn="ctr" rotWithShape="0">
                       <a:schemeClr val="bg2"/>
@@ -31427,7 +31394,7 @@
     </p:spTree>
     <p:extLst>
       <p:ext uri="{BB962C8B-B14F-4D97-AF65-F5344CB8AC3E}">
-        <p14:creationId xmlns:p14="http://schemas.microsoft.com/office/powerpoint/2010/main" val="1968421232"/>
+        <p14:creationId xmlns:p14="http://schemas.microsoft.com/office/powerpoint/2010/main" xmlns="" val="1968421232"/>
       </p:ext>
     </p:extLst>
   </p:cSld>
@@ -31470,10 +31437,10 @@
           <p:nvPr/>
         </p:nvPicPr>
         <p:blipFill>
-          <a:blip r:embed="rId2">
+          <a:blip r:embed="rId2" cstate="print">
             <a:extLst>
               <a:ext uri="{28A0092B-C50C-407E-A947-70E740481C1C}">
-                <a14:useLocalDpi xmlns:a14="http://schemas.microsoft.com/office/drawing/2010/main" val="0"/>
+                <a14:useLocalDpi xmlns:a14="http://schemas.microsoft.com/office/drawing/2010/main" xmlns="" val="0"/>
               </a:ext>
             </a:extLst>
           </a:blip>
@@ -31497,14 +31464,14 @@
           <a:effectLst/>
           <a:extLst>
             <a:ext uri="{909E8E84-426E-40DD-AFC4-6F175D3DCCD1}">
-              <a14:hiddenFill xmlns:a14="http://schemas.microsoft.com/office/drawing/2010/main">
+              <a14:hiddenFill xmlns:a14="http://schemas.microsoft.com/office/drawing/2010/main" xmlns="">
                 <a:solidFill>
                   <a:schemeClr val="accent1"/>
                 </a:solidFill>
               </a14:hiddenFill>
             </a:ext>
             <a:ext uri="{91240B29-F687-4F45-9708-019B960494DF}">
-              <a14:hiddenLine xmlns:a14="http://schemas.microsoft.com/office/drawing/2010/main" w="9525">
+              <a14:hiddenLine xmlns:a14="http://schemas.microsoft.com/office/drawing/2010/main" xmlns="" w="9525">
                 <a:solidFill>
                   <a:schemeClr val="tx1"/>
                 </a:solidFill>
@@ -31514,7 +31481,7 @@
               </a14:hiddenLine>
             </a:ext>
             <a:ext uri="{AF507438-7753-43E0-B8FC-AC1667EBCBE1}">
-              <a14:hiddenEffects xmlns:a14="http://schemas.microsoft.com/office/drawing/2010/main">
+              <a14:hiddenEffects xmlns:a14="http://schemas.microsoft.com/office/drawing/2010/main" xmlns="">
                 <a:effectLst>
                   <a:outerShdw dist="35921" dir="2700000" algn="ctr" rotWithShape="0">
                     <a:schemeClr val="bg2"/>
@@ -31666,10 +31633,10 @@
           <p:nvPr/>
         </p:nvPicPr>
         <p:blipFill>
-          <a:blip r:embed="rId3">
+          <a:blip r:embed="rId3" cstate="print">
             <a:extLst>
               <a:ext uri="{28A0092B-C50C-407E-A947-70E740481C1C}">
-                <a14:useLocalDpi xmlns:a14="http://schemas.microsoft.com/office/drawing/2010/main" val="0"/>
+                <a14:useLocalDpi xmlns:a14="http://schemas.microsoft.com/office/drawing/2010/main" xmlns="" val="0"/>
               </a:ext>
             </a:extLst>
           </a:blip>
@@ -31689,7 +31656,7 @@
           <a:noFill/>
           <a:extLst>
             <a:ext uri="{909E8E84-426E-40DD-AFC4-6F175D3DCCD1}">
-              <a14:hiddenFill xmlns:a14="http://schemas.microsoft.com/office/drawing/2010/main">
+              <a14:hiddenFill xmlns:a14="http://schemas.microsoft.com/office/drawing/2010/main" xmlns="">
                 <a:solidFill>
                   <a:srgbClr val="FFFFFF"/>
                 </a:solidFill>
@@ -31707,10 +31674,10 @@
           <p:nvPr/>
         </p:nvPicPr>
         <p:blipFill>
-          <a:blip r:embed="rId4">
+          <a:blip r:embed="rId4" cstate="print">
             <a:extLst>
               <a:ext uri="{28A0092B-C50C-407E-A947-70E740481C1C}">
-                <a14:useLocalDpi xmlns:a14="http://schemas.microsoft.com/office/drawing/2010/main" val="0"/>
+                <a14:useLocalDpi xmlns:a14="http://schemas.microsoft.com/office/drawing/2010/main" xmlns="" val="0"/>
               </a:ext>
             </a:extLst>
           </a:blip>
@@ -31739,14 +31706,14 @@
           <a:effectLst/>
           <a:extLst>
             <a:ext uri="{909E8E84-426E-40DD-AFC4-6F175D3DCCD1}">
-              <a14:hiddenFill xmlns:a14="http://schemas.microsoft.com/office/drawing/2010/main">
+              <a14:hiddenFill xmlns:a14="http://schemas.microsoft.com/office/drawing/2010/main" xmlns="">
                 <a:solidFill>
                   <a:schemeClr val="accent1"/>
                 </a:solidFill>
               </a14:hiddenFill>
             </a:ext>
             <a:ext uri="{AF507438-7753-43E0-B8FC-AC1667EBCBE1}">
-              <a14:hiddenEffects xmlns:a14="http://schemas.microsoft.com/office/drawing/2010/main">
+              <a14:hiddenEffects xmlns:a14="http://schemas.microsoft.com/office/drawing/2010/main" xmlns="">
                 <a:effectLst>
                   <a:outerShdw dist="35921" dir="2700000" algn="ctr" rotWithShape="0">
                     <a:schemeClr val="bg2"/>
@@ -31765,8 +31732,8 @@
         </p:nvSpPr>
         <p:spPr>
           <a:xfrm>
-            <a:off x="866774" y="2990850"/>
-            <a:ext cx="7791451" cy="779381"/>
+            <a:off x="504826" y="2990850"/>
+            <a:ext cx="8153400" cy="830997"/>
           </a:xfrm>
           <a:prstGeom prst="rect">
             <a:avLst/>
@@ -31807,7 +31774,23 @@
                 <a:ea typeface="Arial Unicode MS" pitchFamily="34" charset="-128"/>
                 <a:cs typeface="Arial Unicode MS" pitchFamily="34" charset="-128"/>
               </a:rPr>
-              <a:t>Fabien wants to compare the number of accidents that happened last year which </a:t>
+              <a:t>Fabien wants to compare the number of accidents that happened last </a:t>
+            </a:r>
+            <a:r>
+              <a:rPr lang="en-US" sz="1800" kern="0" dirty="0" smtClean="0">
+                <a:latin typeface="Segoe UI Light" panose="020B0502040204020203" pitchFamily="34" charset="0"/>
+                <a:ea typeface="Arial Unicode MS" pitchFamily="34" charset="-128"/>
+                <a:cs typeface="Arial Unicode MS" pitchFamily="34" charset="-128"/>
+              </a:rPr>
+              <a:t>year in France </a:t>
+            </a:r>
+            <a:r>
+              <a:rPr lang="en-US" sz="1800" kern="0" dirty="0" smtClean="0">
+                <a:latin typeface="Segoe UI Light" panose="020B0502040204020203" pitchFamily="34" charset="0"/>
+                <a:ea typeface="Arial Unicode MS" pitchFamily="34" charset="-128"/>
+                <a:cs typeface="Arial Unicode MS" pitchFamily="34" charset="-128"/>
+              </a:rPr>
+              <a:t>which </a:t>
             </a:r>
             <a:r>
               <a:rPr lang="en-US" kern="0" dirty="0" smtClean="0">
@@ -31899,7 +31882,7 @@
     </p:spTree>
     <p:extLst>
       <p:ext uri="{BB962C8B-B14F-4D97-AF65-F5344CB8AC3E}">
-        <p14:creationId xmlns:p14="http://schemas.microsoft.com/office/powerpoint/2010/main" val="2385562696"/>
+        <p14:creationId xmlns:p14="http://schemas.microsoft.com/office/powerpoint/2010/main" xmlns="" val="2385562696"/>
       </p:ext>
     </p:extLst>
   </p:cSld>
@@ -32014,6 +31997,33 @@
                                   </p:childTnLst>
                                 </p:cTn>
                               </p:par>
+                              <p:par>
+                                <p:cTn id="13" presetID="1" presetClass="entr" presetSubtype="0" fill="hold" grpId="0" nodeType="withEffect">
+                                  <p:stCondLst>
+                                    <p:cond delay="0"/>
+                                  </p:stCondLst>
+                                  <p:childTnLst>
+                                    <p:set>
+                                      <p:cBhvr>
+                                        <p:cTn id="14" dur="1" fill="hold">
+                                          <p:stCondLst>
+                                            <p:cond delay="0"/>
+                                          </p:stCondLst>
+                                        </p:cTn>
+                                        <p:tgtEl>
+                                          <p:spTgt spid="2"/>
+                                        </p:tgtEl>
+                                        <p:attrNameLst>
+                                          <p:attrName>style.visibility</p:attrName>
+                                        </p:attrNameLst>
+                                      </p:cBhvr>
+                                      <p:to>
+                                        <p:strVal val="visible"/>
+                                      </p:to>
+                                    </p:set>
+                                  </p:childTnLst>
+                                </p:cTn>
+                              </p:par>
                             </p:childTnLst>
                           </p:cTn>
                         </p:par>
@@ -32021,26 +32031,26 @@
                     </p:cTn>
                   </p:par>
                   <p:par>
-                    <p:cTn id="13" fill="hold">
+                    <p:cTn id="15" fill="hold">
                       <p:stCondLst>
                         <p:cond delay="indefinite"/>
                       </p:stCondLst>
                       <p:childTnLst>
                         <p:par>
-                          <p:cTn id="14" fill="hold">
+                          <p:cTn id="16" fill="hold">
                             <p:stCondLst>
                               <p:cond delay="0"/>
                             </p:stCondLst>
                             <p:childTnLst>
                               <p:par>
-                                <p:cTn id="15" presetID="10" presetClass="entr" presetSubtype="0" fill="hold" grpId="0" nodeType="clickEffect">
+                                <p:cTn id="17" presetID="10" presetClass="entr" presetSubtype="0" fill="hold" grpId="0" nodeType="clickEffect">
                                   <p:stCondLst>
                                     <p:cond delay="0"/>
                                   </p:stCondLst>
                                   <p:childTnLst>
                                     <p:set>
                                       <p:cBhvr>
-                                        <p:cTn id="16" dur="1" fill="hold">
+                                        <p:cTn id="18" dur="1" fill="hold">
                                           <p:stCondLst>
                                             <p:cond delay="0"/>
                                           </p:stCondLst>
@@ -32058,7 +32068,7 @@
                                     </p:set>
                                     <p:animEffect transition="in" filter="fade">
                                       <p:cBhvr>
-                                        <p:cTn id="17" dur="500"/>
+                                        <p:cTn id="19" dur="500"/>
                                         <p:tgtEl>
                                           <p:spTgt spid="6"/>
                                         </p:tgtEl>
@@ -32096,6 +32106,7 @@
     </p:tnLst>
     <p:bldLst>
       <p:bldP spid="6" grpId="0" animBg="1"/>
+      <p:bldP spid="2" grpId="0" animBg="1"/>
     </p:bldLst>
   </p:timing>
 </p:sld>
@@ -32289,7 +32300,7 @@
     </p:spTree>
     <p:extLst>
       <p:ext uri="{BB962C8B-B14F-4D97-AF65-F5344CB8AC3E}">
-        <p14:creationId xmlns:p14="http://schemas.microsoft.com/office/powerpoint/2010/main" val="58538897"/>
+        <p14:creationId xmlns:p14="http://schemas.microsoft.com/office/powerpoint/2010/main" xmlns="" val="58538897"/>
       </p:ext>
     </p:extLst>
   </p:cSld>
@@ -32379,13 +32390,7 @@
               <a:rPr lang="en-US" b="0" dirty="0" smtClean="0">
                 <a:latin typeface="Segoe UI Light" panose="020B0502040204020203" pitchFamily="34" charset="0"/>
               </a:rPr>
-              <a:t>Build a data crawler for public data hubs, that will be able to generate enhanced DCAT descriptions with the semantic concepts and topics generated from </a:t>
-            </a:r>
-            <a:r>
-              <a:rPr lang="en-US" b="0" dirty="0" smtClean="0">
-                <a:latin typeface="Segoe UI Light" panose="020B0502040204020203" pitchFamily="34" charset="0"/>
-              </a:rPr>
-              <a:t>our tools</a:t>
+              <a:t>Build a data crawler for public data hubs, that will be able to generate enhanced DCAT descriptions with the semantic concepts and topics generated from our tools</a:t>
             </a:r>
           </a:p>
           <a:p>
@@ -32409,7 +32414,25 @@
               <a:rPr lang="en-US" b="0" dirty="0" smtClean="0">
                 <a:latin typeface="Segoe UI Light" panose="020B0502040204020203" pitchFamily="34" charset="0"/>
               </a:rPr>
-              <a:t>Build a simple comprehensive data quality tool and add a quality metric to datasets description</a:t>
+              <a:t>Build a </a:t>
+            </a:r>
+            <a:r>
+              <a:rPr lang="en-US" b="0" smtClean="0">
+                <a:latin typeface="Segoe UI Light" panose="020B0502040204020203" pitchFamily="34" charset="0"/>
+              </a:rPr>
+              <a:t>simple </a:t>
+            </a:r>
+            <a:r>
+              <a:rPr lang="en-US" b="0" smtClean="0">
+                <a:latin typeface="Segoe UI Light" panose="020B0502040204020203" pitchFamily="34" charset="0"/>
+              </a:rPr>
+              <a:t>but comprehensive </a:t>
+            </a:r>
+            <a:r>
+              <a:rPr lang="en-US" b="0" dirty="0" smtClean="0">
+                <a:latin typeface="Segoe UI Light" panose="020B0502040204020203" pitchFamily="34" charset="0"/>
+              </a:rPr>
+              <a:t>data quality tool and add a quality metric to datasets description</a:t>
             </a:r>
             <a:endParaRPr lang="en-US" b="0" dirty="0">
               <a:latin typeface="Segoe UI Light" panose="020B0502040204020203" pitchFamily="34" charset="0"/>
@@ -32420,7 +32443,7 @@
     </p:spTree>
     <p:extLst>
       <p:ext uri="{BB962C8B-B14F-4D97-AF65-F5344CB8AC3E}">
-        <p14:creationId xmlns:p14="http://schemas.microsoft.com/office/powerpoint/2010/main" val="1617089566"/>
+        <p14:creationId xmlns:p14="http://schemas.microsoft.com/office/powerpoint/2010/main" xmlns="" val="1617089566"/>
       </p:ext>
     </p:extLst>
   </p:cSld>
@@ -32553,7 +32576,7 @@
           <a:blip r:embed="rId3" cstate="print">
             <a:extLst>
               <a:ext uri="{28A0092B-C50C-407E-A947-70E740481C1C}">
-                <a14:useLocalDpi xmlns:a14="http://schemas.microsoft.com/office/drawing/2010/main" val="0"/>
+                <a14:useLocalDpi xmlns:a14="http://schemas.microsoft.com/office/drawing/2010/main" xmlns="" val="0"/>
               </a:ext>
             </a:extLst>
           </a:blip>
@@ -32573,7 +32596,7 @@
           <a:noFill/>
           <a:extLst>
             <a:ext uri="{909E8E84-426E-40DD-AFC4-6F175D3DCCD1}">
-              <a14:hiddenFill xmlns:a14="http://schemas.microsoft.com/office/drawing/2010/main">
+              <a14:hiddenFill xmlns:a14="http://schemas.microsoft.com/office/drawing/2010/main" xmlns="">
                 <a:solidFill>
                   <a:srgbClr val="FFFFFF"/>
                 </a:solidFill>
@@ -32585,7 +32608,7 @@
     </p:spTree>
     <p:extLst>
       <p:ext uri="{BB962C8B-B14F-4D97-AF65-F5344CB8AC3E}">
-        <p14:creationId xmlns:p14="http://schemas.microsoft.com/office/powerpoint/2010/main" val="2987907903"/>
+        <p14:creationId xmlns:p14="http://schemas.microsoft.com/office/powerpoint/2010/main" xmlns="" val="2987907903"/>
       </p:ext>
     </p:extLst>
   </p:cSld>
@@ -32951,7 +32974,7 @@
     </p:spTree>
     <p:extLst>
       <p:ext uri="{BB962C8B-B14F-4D97-AF65-F5344CB8AC3E}">
-        <p14:creationId xmlns:p14="http://schemas.microsoft.com/office/powerpoint/2010/main" val="3684045596"/>
+        <p14:creationId xmlns:p14="http://schemas.microsoft.com/office/powerpoint/2010/main" xmlns="" val="3684045596"/>
       </p:ext>
     </p:extLst>
   </p:cSld>
@@ -33224,7 +33247,7 @@
     </p:spTree>
     <p:extLst>
       <p:ext uri="{BB962C8B-B14F-4D97-AF65-F5344CB8AC3E}">
-        <p14:creationId xmlns:p14="http://schemas.microsoft.com/office/powerpoint/2010/main" val="3157884324"/>
+        <p14:creationId xmlns:p14="http://schemas.microsoft.com/office/powerpoint/2010/main" xmlns="" val="3157884324"/>
       </p:ext>
     </p:extLst>
   </p:cSld>
@@ -33603,7 +33626,7 @@
     </p:spTree>
     <p:extLst>
       <p:ext uri="{BB962C8B-B14F-4D97-AF65-F5344CB8AC3E}">
-        <p14:creationId xmlns:p14="http://schemas.microsoft.com/office/powerpoint/2010/main" val="2290444703"/>
+        <p14:creationId xmlns:p14="http://schemas.microsoft.com/office/powerpoint/2010/main" xmlns="" val="2290444703"/>
       </p:ext>
     </p:extLst>
   </p:cSld>
@@ -35775,7 +35798,7 @@
     </p:spTree>
     <p:extLst>
       <p:ext uri="{BB962C8B-B14F-4D97-AF65-F5344CB8AC3E}">
-        <p14:creationId xmlns:p14="http://schemas.microsoft.com/office/powerpoint/2010/main" val="1894750242"/>
+        <p14:creationId xmlns:p14="http://schemas.microsoft.com/office/powerpoint/2010/main" xmlns="" val="1894750242"/>
       </p:ext>
     </p:extLst>
   </p:cSld>
@@ -38642,7 +38665,7 @@
     </p:spTree>
     <p:extLst>
       <p:ext uri="{BB962C8B-B14F-4D97-AF65-F5344CB8AC3E}">
-        <p14:creationId xmlns:p14="http://schemas.microsoft.com/office/powerpoint/2010/main" val="1279617305"/>
+        <p14:creationId xmlns:p14="http://schemas.microsoft.com/office/powerpoint/2010/main" xmlns="" val="1279617305"/>
       </p:ext>
     </p:extLst>
   </p:cSld>
@@ -38978,7 +39001,7 @@
     </p:spTree>
     <p:extLst>
       <p:ext uri="{BB962C8B-B14F-4D97-AF65-F5344CB8AC3E}">
-        <p14:creationId xmlns:p14="http://schemas.microsoft.com/office/powerpoint/2010/main" val="2658660240"/>
+        <p14:creationId xmlns:p14="http://schemas.microsoft.com/office/powerpoint/2010/main" xmlns="" val="2658660240"/>
       </p:ext>
     </p:extLst>
   </p:cSld>

</xml_diff>